<commit_message>
Finished lesson 9 slides
</commit_message>
<xml_diff>
--- a/Slides/Lesson 9.pptx
+++ b/Slides/Lesson 9.pptx
@@ -8,7 +8,9 @@
     <p:sldId id="256" r:id="rId2"/>
     <p:sldId id="257" r:id="rId3"/>
     <p:sldId id="262" r:id="rId4"/>
-    <p:sldId id="272" r:id="rId5"/>
+    <p:sldId id="273" r:id="rId5"/>
+    <p:sldId id="274" r:id="rId6"/>
+    <p:sldId id="272" r:id="rId7"/>
   </p:sldIdLst>
   <p:sldSz cx="12192000" cy="6858000"/>
   <p:notesSz cx="6858000" cy="9144000"/>
@@ -172,7 +174,7 @@
           <a:noFill/>
           <a:extLst>
             <a:ext uri="{909E8E84-426E-40dd-AFC4-6F175D3DCCD1}">
-              <a14:hiddenFill xmlns:a14="http://schemas.microsoft.com/office/drawing/2010/main" xmlns="">
+              <a14:hiddenFill xmlns="" xmlns:a14="http://schemas.microsoft.com/office/drawing/2010/main">
                 <a:solidFill>
                   <a:srgbClr val="FFFFFF"/>
                 </a:solidFill>
@@ -231,7 +233,7 @@
             </a:ln>
             <a:extLst>
               <a:ext uri="{91240B29-F687-4f45-9708-019B960494DF}">
-                <a14:hiddenLine xmlns:a14="http://schemas.microsoft.com/office/drawing/2010/main" xmlns="" w="9525">
+                <a14:hiddenLine xmlns="" xmlns:a14="http://schemas.microsoft.com/office/drawing/2010/main" w="9525">
                   <a:solidFill>
                     <a:srgbClr val="000000"/>
                   </a:solidFill>
@@ -321,7 +323,7 @@
             </a:ln>
             <a:extLst>
               <a:ext uri="{91240B29-F687-4f45-9708-019B960494DF}">
-                <a14:hiddenLine xmlns:a14="http://schemas.microsoft.com/office/drawing/2010/main" xmlns="" w="9525">
+                <a14:hiddenLine xmlns="" xmlns:a14="http://schemas.microsoft.com/office/drawing/2010/main" w="9525">
                   <a:solidFill>
                     <a:srgbClr val="000000"/>
                   </a:solidFill>
@@ -411,7 +413,7 @@
             </a:ln>
             <a:extLst>
               <a:ext uri="{91240B29-F687-4f45-9708-019B960494DF}">
-                <a14:hiddenLine xmlns:a14="http://schemas.microsoft.com/office/drawing/2010/main" xmlns="" w="9525">
+                <a14:hiddenLine xmlns="" xmlns:a14="http://schemas.microsoft.com/office/drawing/2010/main" w="9525">
                   <a:solidFill>
                     <a:srgbClr val="000000"/>
                   </a:solidFill>
@@ -445,7 +447,7 @@
             </a:ln>
             <a:extLst>
               <a:ext uri="{91240B29-F687-4f45-9708-019B960494DF}">
-                <a14:hiddenLine xmlns:a14="http://schemas.microsoft.com/office/drawing/2010/main" xmlns="" w="9525">
+                <a14:hiddenLine xmlns="" xmlns:a14="http://schemas.microsoft.com/office/drawing/2010/main" w="9525">
                   <a:solidFill>
                     <a:srgbClr val="000000"/>
                   </a:solidFill>
@@ -535,7 +537,7 @@
             </a:ln>
             <a:extLst>
               <a:ext uri="{91240B29-F687-4f45-9708-019B960494DF}">
-                <a14:hiddenLine xmlns:a14="http://schemas.microsoft.com/office/drawing/2010/main" xmlns="" w="9525">
+                <a14:hiddenLine xmlns="" xmlns:a14="http://schemas.microsoft.com/office/drawing/2010/main" w="9525">
                   <a:solidFill>
                     <a:srgbClr val="000000"/>
                   </a:solidFill>
@@ -597,7 +599,7 @@
             </a:ln>
             <a:extLst>
               <a:ext uri="{91240B29-F687-4f45-9708-019B960494DF}">
-                <a14:hiddenLine xmlns:a14="http://schemas.microsoft.com/office/drawing/2010/main" xmlns="" w="9525">
+                <a14:hiddenLine xmlns="" xmlns:a14="http://schemas.microsoft.com/office/drawing/2010/main" w="9525">
                   <a:solidFill>
                     <a:srgbClr val="000000"/>
                   </a:solidFill>
@@ -659,7 +661,7 @@
             </a:ln>
             <a:extLst>
               <a:ext uri="{91240B29-F687-4f45-9708-019B960494DF}">
-                <a14:hiddenLine xmlns:a14="http://schemas.microsoft.com/office/drawing/2010/main" xmlns="" w="9525">
+                <a14:hiddenLine xmlns="" xmlns:a14="http://schemas.microsoft.com/office/drawing/2010/main" w="9525">
                   <a:solidFill>
                     <a:srgbClr val="000000"/>
                   </a:solidFill>
@@ -749,7 +751,7 @@
             </a:ln>
             <a:extLst>
               <a:ext uri="{91240B29-F687-4f45-9708-019B960494DF}">
-                <a14:hiddenLine xmlns:a14="http://schemas.microsoft.com/office/drawing/2010/main" xmlns="" w="9525">
+                <a14:hiddenLine xmlns="" xmlns:a14="http://schemas.microsoft.com/office/drawing/2010/main" w="9525">
                   <a:solidFill>
                     <a:srgbClr val="000000"/>
                   </a:solidFill>
@@ -811,7 +813,7 @@
             </a:ln>
             <a:extLst>
               <a:ext uri="{91240B29-F687-4f45-9708-019B960494DF}">
-                <a14:hiddenLine xmlns:a14="http://schemas.microsoft.com/office/drawing/2010/main" xmlns="" w="9525">
+                <a14:hiddenLine xmlns="" xmlns:a14="http://schemas.microsoft.com/office/drawing/2010/main" w="9525">
                   <a:solidFill>
                     <a:srgbClr val="000000"/>
                   </a:solidFill>
@@ -873,7 +875,7 @@
             </a:ln>
             <a:extLst>
               <a:ext uri="{91240B29-F687-4f45-9708-019B960494DF}">
-                <a14:hiddenLine xmlns:a14="http://schemas.microsoft.com/office/drawing/2010/main" xmlns="" w="9525">
+                <a14:hiddenLine xmlns="" xmlns:a14="http://schemas.microsoft.com/office/drawing/2010/main" w="9525">
                   <a:solidFill>
                     <a:srgbClr val="000000"/>
                   </a:solidFill>
@@ -963,7 +965,7 @@
             </a:ln>
             <a:extLst>
               <a:ext uri="{91240B29-F687-4f45-9708-019B960494DF}">
-                <a14:hiddenLine xmlns:a14="http://schemas.microsoft.com/office/drawing/2010/main" xmlns="" w="9525">
+                <a14:hiddenLine xmlns="" xmlns:a14="http://schemas.microsoft.com/office/drawing/2010/main" w="9525">
                   <a:solidFill>
                     <a:srgbClr val="000000"/>
                   </a:solidFill>
@@ -1053,7 +1055,7 @@
             </a:ln>
             <a:extLst>
               <a:ext uri="{91240B29-F687-4f45-9708-019B960494DF}">
-                <a14:hiddenLine xmlns:a14="http://schemas.microsoft.com/office/drawing/2010/main" xmlns="" w="9525">
+                <a14:hiddenLine xmlns="" xmlns:a14="http://schemas.microsoft.com/office/drawing/2010/main" w="9525">
                   <a:solidFill>
                     <a:srgbClr val="000000"/>
                   </a:solidFill>
@@ -1115,7 +1117,7 @@
             </a:ln>
             <a:extLst>
               <a:ext uri="{91240B29-F687-4f45-9708-019B960494DF}">
-                <a14:hiddenLine xmlns:a14="http://schemas.microsoft.com/office/drawing/2010/main" xmlns="" w="9525">
+                <a14:hiddenLine xmlns="" xmlns:a14="http://schemas.microsoft.com/office/drawing/2010/main" w="9525">
                   <a:solidFill>
                     <a:srgbClr val="000000"/>
                   </a:solidFill>
@@ -1225,7 +1227,7 @@
             </a:ln>
             <a:extLst>
               <a:ext uri="{91240B29-F687-4f45-9708-019B960494DF}">
-                <a14:hiddenLine xmlns:a14="http://schemas.microsoft.com/office/drawing/2010/main" xmlns="" w="9525">
+                <a14:hiddenLine xmlns="" xmlns:a14="http://schemas.microsoft.com/office/drawing/2010/main" w="9525">
                   <a:solidFill>
                     <a:srgbClr val="000000"/>
                   </a:solidFill>
@@ -1287,7 +1289,7 @@
             </a:ln>
             <a:extLst>
               <a:ext uri="{91240B29-F687-4f45-9708-019B960494DF}">
-                <a14:hiddenLine xmlns:a14="http://schemas.microsoft.com/office/drawing/2010/main" xmlns="" w="9525">
+                <a14:hiddenLine xmlns="" xmlns:a14="http://schemas.microsoft.com/office/drawing/2010/main" w="9525">
                   <a:solidFill>
                     <a:srgbClr val="000000"/>
                   </a:solidFill>
@@ -1377,7 +1379,7 @@
             </a:ln>
             <a:extLst>
               <a:ext uri="{91240B29-F687-4f45-9708-019B960494DF}">
-                <a14:hiddenLine xmlns:a14="http://schemas.microsoft.com/office/drawing/2010/main" xmlns="" w="9525">
+                <a14:hiddenLine xmlns="" xmlns:a14="http://schemas.microsoft.com/office/drawing/2010/main" w="9525">
                   <a:solidFill>
                     <a:srgbClr val="000000"/>
                   </a:solidFill>
@@ -1467,7 +1469,7 @@
             </a:ln>
             <a:extLst>
               <a:ext uri="{91240B29-F687-4f45-9708-019B960494DF}">
-                <a14:hiddenLine xmlns:a14="http://schemas.microsoft.com/office/drawing/2010/main" xmlns="" w="9525">
+                <a14:hiddenLine xmlns="" xmlns:a14="http://schemas.microsoft.com/office/drawing/2010/main" w="9525">
                   <a:solidFill>
                     <a:srgbClr val="000000"/>
                   </a:solidFill>
@@ -1529,7 +1531,7 @@
             </a:ln>
             <a:extLst>
               <a:ext uri="{91240B29-F687-4f45-9708-019B960494DF}">
-                <a14:hiddenLine xmlns:a14="http://schemas.microsoft.com/office/drawing/2010/main" xmlns="" w="9525">
+                <a14:hiddenLine xmlns="" xmlns:a14="http://schemas.microsoft.com/office/drawing/2010/main" w="9525">
                   <a:solidFill>
                     <a:srgbClr val="000000"/>
                   </a:solidFill>
@@ -1619,7 +1621,7 @@
             </a:ln>
             <a:extLst>
               <a:ext uri="{91240B29-F687-4f45-9708-019B960494DF}">
-                <a14:hiddenLine xmlns:a14="http://schemas.microsoft.com/office/drawing/2010/main" xmlns="" w="9525">
+                <a14:hiddenLine xmlns="" xmlns:a14="http://schemas.microsoft.com/office/drawing/2010/main" w="9525">
                   <a:solidFill>
                     <a:srgbClr val="000000"/>
                   </a:solidFill>
@@ -1709,7 +1711,7 @@
             </a:ln>
             <a:extLst>
               <a:ext uri="{91240B29-F687-4f45-9708-019B960494DF}">
-                <a14:hiddenLine xmlns:a14="http://schemas.microsoft.com/office/drawing/2010/main" xmlns="" w="9525">
+                <a14:hiddenLine xmlns="" xmlns:a14="http://schemas.microsoft.com/office/drawing/2010/main" w="9525">
                   <a:solidFill>
                     <a:srgbClr val="000000"/>
                   </a:solidFill>
@@ -1765,7 +1767,7 @@
             </a:ln>
             <a:extLst>
               <a:ext uri="{91240B29-F687-4f45-9708-019B960494DF}">
-                <a14:hiddenLine xmlns:a14="http://schemas.microsoft.com/office/drawing/2010/main" xmlns="" w="9525">
+                <a14:hiddenLine xmlns="" xmlns:a14="http://schemas.microsoft.com/office/drawing/2010/main" w="9525">
                   <a:solidFill>
                     <a:srgbClr val="000000"/>
                   </a:solidFill>
@@ -1855,7 +1857,7 @@
             </a:ln>
             <a:extLst>
               <a:ext uri="{91240B29-F687-4f45-9708-019B960494DF}">
-                <a14:hiddenLine xmlns:a14="http://schemas.microsoft.com/office/drawing/2010/main" xmlns="" w="9525">
+                <a14:hiddenLine xmlns="" xmlns:a14="http://schemas.microsoft.com/office/drawing/2010/main" w="9525">
                   <a:solidFill>
                     <a:srgbClr val="000000"/>
                   </a:solidFill>
@@ -1911,7 +1913,7 @@
             </a:ln>
             <a:extLst>
               <a:ext uri="{91240B29-F687-4f45-9708-019B960494DF}">
-                <a14:hiddenLine xmlns:a14="http://schemas.microsoft.com/office/drawing/2010/main" xmlns="" w="9525">
+                <a14:hiddenLine xmlns="" xmlns:a14="http://schemas.microsoft.com/office/drawing/2010/main" w="9525">
                   <a:solidFill>
                     <a:srgbClr val="000000"/>
                   </a:solidFill>
@@ -2001,7 +2003,7 @@
             </a:ln>
             <a:extLst>
               <a:ext uri="{91240B29-F687-4f45-9708-019B960494DF}">
-                <a14:hiddenLine xmlns:a14="http://schemas.microsoft.com/office/drawing/2010/main" xmlns="" w="9525">
+                <a14:hiddenLine xmlns="" xmlns:a14="http://schemas.microsoft.com/office/drawing/2010/main" w="9525">
                   <a:solidFill>
                     <a:srgbClr val="000000"/>
                   </a:solidFill>
@@ -2069,7 +2071,7 @@
             </a:ln>
             <a:extLst>
               <a:ext uri="{91240B29-F687-4f45-9708-019B960494DF}">
-                <a14:hiddenLine xmlns:a14="http://schemas.microsoft.com/office/drawing/2010/main" xmlns="" w="9525">
+                <a14:hiddenLine xmlns="" xmlns:a14="http://schemas.microsoft.com/office/drawing/2010/main" w="9525">
                   <a:solidFill>
                     <a:srgbClr val="000000"/>
                   </a:solidFill>
@@ -2159,7 +2161,7 @@
             </a:ln>
             <a:extLst>
               <a:ext uri="{91240B29-F687-4f45-9708-019B960494DF}">
-                <a14:hiddenLine xmlns:a14="http://schemas.microsoft.com/office/drawing/2010/main" xmlns="" w="9525">
+                <a14:hiddenLine xmlns="" xmlns:a14="http://schemas.microsoft.com/office/drawing/2010/main" w="9525">
                   <a:solidFill>
                     <a:srgbClr val="000000"/>
                   </a:solidFill>
@@ -2227,7 +2229,7 @@
             </a:ln>
             <a:extLst>
               <a:ext uri="{91240B29-F687-4f45-9708-019B960494DF}">
-                <a14:hiddenLine xmlns:a14="http://schemas.microsoft.com/office/drawing/2010/main" xmlns="" w="9525">
+                <a14:hiddenLine xmlns="" xmlns:a14="http://schemas.microsoft.com/office/drawing/2010/main" w="9525">
                   <a:solidFill>
                     <a:srgbClr val="000000"/>
                   </a:solidFill>
@@ -2317,7 +2319,7 @@
             </a:ln>
             <a:extLst>
               <a:ext uri="{91240B29-F687-4f45-9708-019B960494DF}">
-                <a14:hiddenLine xmlns:a14="http://schemas.microsoft.com/office/drawing/2010/main" xmlns="" w="9525">
+                <a14:hiddenLine xmlns="" xmlns:a14="http://schemas.microsoft.com/office/drawing/2010/main" w="9525">
                   <a:solidFill>
                     <a:srgbClr val="000000"/>
                   </a:solidFill>
@@ -2351,7 +2353,7 @@
             </a:ln>
             <a:extLst>
               <a:ext uri="{91240B29-F687-4f45-9708-019B960494DF}">
-                <a14:hiddenLine xmlns:a14="http://schemas.microsoft.com/office/drawing/2010/main" xmlns="" w="9525">
+                <a14:hiddenLine xmlns="" xmlns:a14="http://schemas.microsoft.com/office/drawing/2010/main" w="9525">
                   <a:solidFill>
                     <a:srgbClr val="000000"/>
                   </a:solidFill>
@@ -2441,7 +2443,7 @@
             </a:ln>
             <a:extLst>
               <a:ext uri="{91240B29-F687-4f45-9708-019B960494DF}">
-                <a14:hiddenLine xmlns:a14="http://schemas.microsoft.com/office/drawing/2010/main" xmlns="" w="9525">
+                <a14:hiddenLine xmlns="" xmlns:a14="http://schemas.microsoft.com/office/drawing/2010/main" w="9525">
                   <a:solidFill>
                     <a:srgbClr val="000000"/>
                   </a:solidFill>
@@ -2503,7 +2505,7 @@
             </a:ln>
             <a:extLst>
               <a:ext uri="{91240B29-F687-4f45-9708-019B960494DF}">
-                <a14:hiddenLine xmlns:a14="http://schemas.microsoft.com/office/drawing/2010/main" xmlns="" w="9525">
+                <a14:hiddenLine xmlns="" xmlns:a14="http://schemas.microsoft.com/office/drawing/2010/main" w="9525">
                   <a:solidFill>
                     <a:srgbClr val="000000"/>
                   </a:solidFill>
@@ -2565,7 +2567,7 @@
             </a:ln>
             <a:extLst>
               <a:ext uri="{91240B29-F687-4f45-9708-019B960494DF}">
-                <a14:hiddenLine xmlns:a14="http://schemas.microsoft.com/office/drawing/2010/main" xmlns="" w="9525">
+                <a14:hiddenLine xmlns="" xmlns:a14="http://schemas.microsoft.com/office/drawing/2010/main" w="9525">
                   <a:solidFill>
                     <a:srgbClr val="000000"/>
                   </a:solidFill>
@@ -2655,7 +2657,7 @@
             </a:ln>
             <a:extLst>
               <a:ext uri="{91240B29-F687-4f45-9708-019B960494DF}">
-                <a14:hiddenLine xmlns:a14="http://schemas.microsoft.com/office/drawing/2010/main" xmlns="" w="9525">
+                <a14:hiddenLine xmlns="" xmlns:a14="http://schemas.microsoft.com/office/drawing/2010/main" w="9525">
                   <a:solidFill>
                     <a:srgbClr val="000000"/>
                   </a:solidFill>
@@ -2723,7 +2725,7 @@
             </a:ln>
             <a:extLst>
               <a:ext uri="{91240B29-F687-4f45-9708-019B960494DF}">
-                <a14:hiddenLine xmlns:a14="http://schemas.microsoft.com/office/drawing/2010/main" xmlns="" w="9525">
+                <a14:hiddenLine xmlns="" xmlns:a14="http://schemas.microsoft.com/office/drawing/2010/main" w="9525">
                   <a:solidFill>
                     <a:srgbClr val="000000"/>
                   </a:solidFill>
@@ -2785,7 +2787,7 @@
             </a:ln>
             <a:extLst>
               <a:ext uri="{91240B29-F687-4f45-9708-019B960494DF}">
-                <a14:hiddenLine xmlns:a14="http://schemas.microsoft.com/office/drawing/2010/main" xmlns="" w="9525">
+                <a14:hiddenLine xmlns="" xmlns:a14="http://schemas.microsoft.com/office/drawing/2010/main" w="9525">
                   <a:solidFill>
                     <a:srgbClr val="000000"/>
                   </a:solidFill>
@@ -2875,7 +2877,7 @@
             </a:ln>
             <a:extLst>
               <a:ext uri="{91240B29-F687-4f45-9708-019B960494DF}">
-                <a14:hiddenLine xmlns:a14="http://schemas.microsoft.com/office/drawing/2010/main" xmlns="" w="9525">
+                <a14:hiddenLine xmlns="" xmlns:a14="http://schemas.microsoft.com/office/drawing/2010/main" w="9525">
                   <a:solidFill>
                     <a:srgbClr val="000000"/>
                   </a:solidFill>
@@ -2937,7 +2939,7 @@
             </a:ln>
             <a:extLst>
               <a:ext uri="{91240B29-F687-4f45-9708-019B960494DF}">
-                <a14:hiddenLine xmlns:a14="http://schemas.microsoft.com/office/drawing/2010/main" xmlns="" w="9525">
+                <a14:hiddenLine xmlns="" xmlns:a14="http://schemas.microsoft.com/office/drawing/2010/main" w="9525">
                   <a:solidFill>
                     <a:srgbClr val="000000"/>
                   </a:solidFill>
@@ -3027,7 +3029,7 @@
             </a:ln>
             <a:extLst>
               <a:ext uri="{91240B29-F687-4f45-9708-019B960494DF}">
-                <a14:hiddenLine xmlns:a14="http://schemas.microsoft.com/office/drawing/2010/main" xmlns="" w="9525">
+                <a14:hiddenLine xmlns="" xmlns:a14="http://schemas.microsoft.com/office/drawing/2010/main" w="9525">
                   <a:solidFill>
                     <a:srgbClr val="000000"/>
                   </a:solidFill>
@@ -3089,7 +3091,7 @@
             </a:ln>
             <a:extLst>
               <a:ext uri="{91240B29-F687-4f45-9708-019B960494DF}">
-                <a14:hiddenLine xmlns:a14="http://schemas.microsoft.com/office/drawing/2010/main" xmlns="" w="9525">
+                <a14:hiddenLine xmlns="" xmlns:a14="http://schemas.microsoft.com/office/drawing/2010/main" w="9525">
                   <a:solidFill>
                     <a:srgbClr val="000000"/>
                   </a:solidFill>
@@ -3179,7 +3181,7 @@
             </a:ln>
             <a:extLst>
               <a:ext uri="{91240B29-F687-4f45-9708-019B960494DF}">
-                <a14:hiddenLine xmlns:a14="http://schemas.microsoft.com/office/drawing/2010/main" xmlns="" w="9525">
+                <a14:hiddenLine xmlns="" xmlns:a14="http://schemas.microsoft.com/office/drawing/2010/main" w="9525">
                   <a:solidFill>
                     <a:srgbClr val="000000"/>
                   </a:solidFill>
@@ -3213,7 +3215,7 @@
             </a:ln>
             <a:extLst>
               <a:ext uri="{91240B29-F687-4f45-9708-019B960494DF}">
-                <a14:hiddenLine xmlns:a14="http://schemas.microsoft.com/office/drawing/2010/main" xmlns="" w="9525">
+                <a14:hiddenLine xmlns="" xmlns:a14="http://schemas.microsoft.com/office/drawing/2010/main" w="9525">
                   <a:solidFill>
                     <a:srgbClr val="000000"/>
                   </a:solidFill>
@@ -3278,7 +3280,7 @@
             </a:ln>
             <a:extLst>
               <a:ext uri="{91240B29-F687-4f45-9708-019B960494DF}">
-                <a14:hiddenLine xmlns:a14="http://schemas.microsoft.com/office/drawing/2010/main" xmlns="" w="9525">
+                <a14:hiddenLine xmlns="" xmlns:a14="http://schemas.microsoft.com/office/drawing/2010/main" w="9525">
                   <a:solidFill>
                     <a:srgbClr val="000000"/>
                   </a:solidFill>
@@ -3368,7 +3370,7 @@
             </a:ln>
             <a:extLst>
               <a:ext uri="{91240B29-F687-4f45-9708-019B960494DF}">
-                <a14:hiddenLine xmlns:a14="http://schemas.microsoft.com/office/drawing/2010/main" xmlns="" w="9525">
+                <a14:hiddenLine xmlns="" xmlns:a14="http://schemas.microsoft.com/office/drawing/2010/main" w="9525">
                   <a:solidFill>
                     <a:srgbClr val="000000"/>
                   </a:solidFill>
@@ -3430,7 +3432,7 @@
             </a:ln>
             <a:extLst>
               <a:ext uri="{91240B29-F687-4f45-9708-019B960494DF}">
-                <a14:hiddenLine xmlns:a14="http://schemas.microsoft.com/office/drawing/2010/main" xmlns="" w="9525">
+                <a14:hiddenLine xmlns="" xmlns:a14="http://schemas.microsoft.com/office/drawing/2010/main" w="9525">
                   <a:solidFill>
                     <a:srgbClr val="000000"/>
                   </a:solidFill>
@@ -3520,7 +3522,7 @@
             </a:ln>
             <a:extLst>
               <a:ext uri="{91240B29-F687-4f45-9708-019B960494DF}">
-                <a14:hiddenLine xmlns:a14="http://schemas.microsoft.com/office/drawing/2010/main" xmlns="" w="9525">
+                <a14:hiddenLine xmlns="" xmlns:a14="http://schemas.microsoft.com/office/drawing/2010/main" w="9525">
                   <a:solidFill>
                     <a:srgbClr val="000000"/>
                   </a:solidFill>
@@ -3610,7 +3612,7 @@
             </a:ln>
             <a:extLst>
               <a:ext uri="{91240B29-F687-4f45-9708-019B960494DF}">
-                <a14:hiddenLine xmlns:a14="http://schemas.microsoft.com/office/drawing/2010/main" xmlns="" w="9525">
+                <a14:hiddenLine xmlns="" xmlns:a14="http://schemas.microsoft.com/office/drawing/2010/main" w="9525">
                   <a:solidFill>
                     <a:srgbClr val="000000"/>
                   </a:solidFill>
@@ -3675,7 +3677,7 @@
             </a:ln>
             <a:extLst>
               <a:ext uri="{91240B29-F687-4f45-9708-019B960494DF}">
-                <a14:hiddenLine xmlns:a14="http://schemas.microsoft.com/office/drawing/2010/main" xmlns="" w="9525">
+                <a14:hiddenLine xmlns="" xmlns:a14="http://schemas.microsoft.com/office/drawing/2010/main" w="9525">
                   <a:solidFill>
                     <a:srgbClr val="000000"/>
                   </a:solidFill>
@@ -3737,7 +3739,7 @@
             </a:ln>
             <a:extLst>
               <a:ext uri="{91240B29-F687-4f45-9708-019B960494DF}">
-                <a14:hiddenLine xmlns:a14="http://schemas.microsoft.com/office/drawing/2010/main" xmlns="" w="9525">
+                <a14:hiddenLine xmlns="" xmlns:a14="http://schemas.microsoft.com/office/drawing/2010/main" w="9525">
                   <a:solidFill>
                     <a:srgbClr val="000000"/>
                   </a:solidFill>
@@ -3827,7 +3829,7 @@
             </a:ln>
             <a:extLst>
               <a:ext uri="{91240B29-F687-4f45-9708-019B960494DF}">
-                <a14:hiddenLine xmlns:a14="http://schemas.microsoft.com/office/drawing/2010/main" xmlns="" w="9525">
+                <a14:hiddenLine xmlns="" xmlns:a14="http://schemas.microsoft.com/office/drawing/2010/main" w="9525">
                   <a:solidFill>
                     <a:srgbClr val="000000"/>
                   </a:solidFill>
@@ -3917,7 +3919,7 @@
             </a:ln>
             <a:extLst>
               <a:ext uri="{91240B29-F687-4f45-9708-019B960494DF}">
-                <a14:hiddenLine xmlns:a14="http://schemas.microsoft.com/office/drawing/2010/main" xmlns="" w="9525">
+                <a14:hiddenLine xmlns="" xmlns:a14="http://schemas.microsoft.com/office/drawing/2010/main" w="9525">
                   <a:solidFill>
                     <a:srgbClr val="000000"/>
                   </a:solidFill>
@@ -3979,7 +3981,7 @@
             </a:ln>
             <a:extLst>
               <a:ext uri="{91240B29-F687-4f45-9708-019B960494DF}">
-                <a14:hiddenLine xmlns:a14="http://schemas.microsoft.com/office/drawing/2010/main" xmlns="" w="9525">
+                <a14:hiddenLine xmlns="" xmlns:a14="http://schemas.microsoft.com/office/drawing/2010/main" w="9525">
                   <a:solidFill>
                     <a:srgbClr val="000000"/>
                   </a:solidFill>
@@ -4099,7 +4101,7 @@
             </a:ln>
             <a:extLst>
               <a:ext uri="{91240B29-F687-4f45-9708-019B960494DF}">
-                <a14:hiddenLine xmlns:a14="http://schemas.microsoft.com/office/drawing/2010/main" xmlns="" w="9525">
+                <a14:hiddenLine xmlns="" xmlns:a14="http://schemas.microsoft.com/office/drawing/2010/main" w="9525">
                   <a:solidFill>
                     <a:srgbClr val="000000"/>
                   </a:solidFill>
@@ -4167,7 +4169,7 @@
             </a:ln>
             <a:extLst>
               <a:ext uri="{91240B29-F687-4f45-9708-019B960494DF}">
-                <a14:hiddenLine xmlns:a14="http://schemas.microsoft.com/office/drawing/2010/main" xmlns="" w="9525">
+                <a14:hiddenLine xmlns="" xmlns:a14="http://schemas.microsoft.com/office/drawing/2010/main" w="9525">
                   <a:solidFill>
                     <a:srgbClr val="000000"/>
                   </a:solidFill>
@@ -4257,7 +4259,7 @@
             </a:ln>
             <a:extLst>
               <a:ext uri="{91240B29-F687-4f45-9708-019B960494DF}">
-                <a14:hiddenLine xmlns:a14="http://schemas.microsoft.com/office/drawing/2010/main" xmlns="" w="9525">
+                <a14:hiddenLine xmlns="" xmlns:a14="http://schemas.microsoft.com/office/drawing/2010/main" w="9525">
                   <a:solidFill>
                     <a:srgbClr val="000000"/>
                   </a:solidFill>
@@ -9071,7 +9073,7 @@
           <a:noFill/>
           <a:extLst>
             <a:ext uri="{909E8E84-426E-40dd-AFC4-6F175D3DCCD1}">
-              <a14:hiddenFill xmlns:a14="http://schemas.microsoft.com/office/drawing/2010/main" xmlns="">
+              <a14:hiddenFill xmlns="" xmlns:a14="http://schemas.microsoft.com/office/drawing/2010/main">
                 <a:solidFill>
                   <a:srgbClr val="FFFFFF"/>
                 </a:solidFill>
@@ -9145,7 +9147,7 @@
               </a:ln>
               <a:extLst>
                 <a:ext uri="{91240B29-F687-4f45-9708-019B960494DF}">
-                  <a14:hiddenLine xmlns:a14="http://schemas.microsoft.com/office/drawing/2010/main" xmlns="" w="9525">
+                  <a14:hiddenLine xmlns="" xmlns:a14="http://schemas.microsoft.com/office/drawing/2010/main" w="9525">
                     <a:solidFill>
                       <a:srgbClr val="000000"/>
                     </a:solidFill>
@@ -9235,7 +9237,7 @@
               </a:ln>
               <a:extLst>
                 <a:ext uri="{91240B29-F687-4f45-9708-019B960494DF}">
-                  <a14:hiddenLine xmlns:a14="http://schemas.microsoft.com/office/drawing/2010/main" xmlns="" w="9525">
+                  <a14:hiddenLine xmlns="" xmlns:a14="http://schemas.microsoft.com/office/drawing/2010/main" w="9525">
                     <a:solidFill>
                       <a:srgbClr val="000000"/>
                     </a:solidFill>
@@ -9325,7 +9327,7 @@
               </a:ln>
               <a:extLst>
                 <a:ext uri="{91240B29-F687-4f45-9708-019B960494DF}">
-                  <a14:hiddenLine xmlns:a14="http://schemas.microsoft.com/office/drawing/2010/main" xmlns="" w="9525">
+                  <a14:hiddenLine xmlns="" xmlns:a14="http://schemas.microsoft.com/office/drawing/2010/main" w="9525">
                     <a:solidFill>
                       <a:srgbClr val="000000"/>
                     </a:solidFill>
@@ -9387,7 +9389,7 @@
               </a:ln>
               <a:extLst>
                 <a:ext uri="{91240B29-F687-4f45-9708-019B960494DF}">
-                  <a14:hiddenLine xmlns:a14="http://schemas.microsoft.com/office/drawing/2010/main" xmlns="" w="9525">
+                  <a14:hiddenLine xmlns="" xmlns:a14="http://schemas.microsoft.com/office/drawing/2010/main" w="9525">
                     <a:solidFill>
                       <a:srgbClr val="000000"/>
                     </a:solidFill>
@@ -9477,7 +9479,7 @@
               </a:ln>
               <a:extLst>
                 <a:ext uri="{91240B29-F687-4f45-9708-019B960494DF}">
-                  <a14:hiddenLine xmlns:a14="http://schemas.microsoft.com/office/drawing/2010/main" xmlns="" w="9525">
+                  <a14:hiddenLine xmlns="" xmlns:a14="http://schemas.microsoft.com/office/drawing/2010/main" w="9525">
                     <a:solidFill>
                       <a:srgbClr val="000000"/>
                     </a:solidFill>
@@ -9539,7 +9541,7 @@
               </a:ln>
               <a:extLst>
                 <a:ext uri="{91240B29-F687-4f45-9708-019B960494DF}">
-                  <a14:hiddenLine xmlns:a14="http://schemas.microsoft.com/office/drawing/2010/main" xmlns="" w="9525">
+                  <a14:hiddenLine xmlns="" xmlns:a14="http://schemas.microsoft.com/office/drawing/2010/main" w="9525">
                     <a:solidFill>
                       <a:srgbClr val="000000"/>
                     </a:solidFill>
@@ -9601,7 +9603,7 @@
               </a:ln>
               <a:extLst>
                 <a:ext uri="{91240B29-F687-4f45-9708-019B960494DF}">
-                  <a14:hiddenLine xmlns:a14="http://schemas.microsoft.com/office/drawing/2010/main" xmlns="" w="9525">
+                  <a14:hiddenLine xmlns="" xmlns:a14="http://schemas.microsoft.com/office/drawing/2010/main" w="9525">
                     <a:solidFill>
                       <a:srgbClr val="000000"/>
                     </a:solidFill>
@@ -9691,7 +9693,7 @@
               </a:ln>
               <a:extLst>
                 <a:ext uri="{91240B29-F687-4f45-9708-019B960494DF}">
-                  <a14:hiddenLine xmlns:a14="http://schemas.microsoft.com/office/drawing/2010/main" xmlns="" w="9525">
+                  <a14:hiddenLine xmlns="" xmlns:a14="http://schemas.microsoft.com/office/drawing/2010/main" w="9525">
                     <a:solidFill>
                       <a:srgbClr val="000000"/>
                     </a:solidFill>
@@ -9781,7 +9783,7 @@
               </a:ln>
               <a:extLst>
                 <a:ext uri="{91240B29-F687-4f45-9708-019B960494DF}">
-                  <a14:hiddenLine xmlns:a14="http://schemas.microsoft.com/office/drawing/2010/main" xmlns="" w="9525">
+                  <a14:hiddenLine xmlns="" xmlns:a14="http://schemas.microsoft.com/office/drawing/2010/main" w="9525">
                     <a:solidFill>
                       <a:srgbClr val="000000"/>
                     </a:solidFill>
@@ -9843,7 +9845,7 @@
               </a:ln>
               <a:extLst>
                 <a:ext uri="{91240B29-F687-4f45-9708-019B960494DF}">
-                  <a14:hiddenLine xmlns:a14="http://schemas.microsoft.com/office/drawing/2010/main" xmlns="" w="9525">
+                  <a14:hiddenLine xmlns="" xmlns:a14="http://schemas.microsoft.com/office/drawing/2010/main" w="9525">
                     <a:solidFill>
                       <a:srgbClr val="000000"/>
                     </a:solidFill>
@@ -9953,7 +9955,7 @@
               </a:ln>
               <a:extLst>
                 <a:ext uri="{91240B29-F687-4f45-9708-019B960494DF}">
-                  <a14:hiddenLine xmlns:a14="http://schemas.microsoft.com/office/drawing/2010/main" xmlns="" w="9525">
+                  <a14:hiddenLine xmlns="" xmlns:a14="http://schemas.microsoft.com/office/drawing/2010/main" w="9525">
                     <a:solidFill>
                       <a:srgbClr val="000000"/>
                     </a:solidFill>
@@ -10037,7 +10039,7 @@
               </a:ln>
               <a:extLst>
                 <a:ext uri="{91240B29-F687-4f45-9708-019B960494DF}">
-                  <a14:hiddenLine xmlns:a14="http://schemas.microsoft.com/office/drawing/2010/main" xmlns="" w="9525">
+                  <a14:hiddenLine xmlns="" xmlns:a14="http://schemas.microsoft.com/office/drawing/2010/main" w="9525">
                     <a:solidFill>
                       <a:srgbClr val="000000"/>
                     </a:solidFill>
@@ -10099,7 +10101,7 @@
               </a:ln>
               <a:extLst>
                 <a:ext uri="{91240B29-F687-4f45-9708-019B960494DF}">
-                  <a14:hiddenLine xmlns:a14="http://schemas.microsoft.com/office/drawing/2010/main" xmlns="" w="9525">
+                  <a14:hiddenLine xmlns="" xmlns:a14="http://schemas.microsoft.com/office/drawing/2010/main" w="9525">
                     <a:solidFill>
                       <a:srgbClr val="000000"/>
                     </a:solidFill>
@@ -10161,7 +10163,7 @@
               </a:ln>
               <a:extLst>
                 <a:ext uri="{91240B29-F687-4f45-9708-019B960494DF}">
-                  <a14:hiddenLine xmlns:a14="http://schemas.microsoft.com/office/drawing/2010/main" xmlns="" w="9525">
+                  <a14:hiddenLine xmlns="" xmlns:a14="http://schemas.microsoft.com/office/drawing/2010/main" w="9525">
                     <a:solidFill>
                       <a:srgbClr val="000000"/>
                     </a:solidFill>
@@ -10251,7 +10253,7 @@
               </a:ln>
               <a:extLst>
                 <a:ext uri="{91240B29-F687-4f45-9708-019B960494DF}">
-                  <a14:hiddenLine xmlns:a14="http://schemas.microsoft.com/office/drawing/2010/main" xmlns="" w="9525">
+                  <a14:hiddenLine xmlns="" xmlns:a14="http://schemas.microsoft.com/office/drawing/2010/main" w="9525">
                     <a:solidFill>
                       <a:srgbClr val="000000"/>
                     </a:solidFill>
@@ -10285,7 +10287,7 @@
               </a:ln>
               <a:extLst>
                 <a:ext uri="{91240B29-F687-4f45-9708-019B960494DF}">
-                  <a14:hiddenLine xmlns:a14="http://schemas.microsoft.com/office/drawing/2010/main" xmlns="" w="9525">
+                  <a14:hiddenLine xmlns="" xmlns:a14="http://schemas.microsoft.com/office/drawing/2010/main" w="9525">
                     <a:solidFill>
                       <a:srgbClr val="000000"/>
                     </a:solidFill>
@@ -10350,7 +10352,7 @@
               </a:ln>
               <a:extLst>
                 <a:ext uri="{91240B29-F687-4f45-9708-019B960494DF}">
-                  <a14:hiddenLine xmlns:a14="http://schemas.microsoft.com/office/drawing/2010/main" xmlns="" w="9525">
+                  <a14:hiddenLine xmlns="" xmlns:a14="http://schemas.microsoft.com/office/drawing/2010/main" w="9525">
                     <a:solidFill>
                       <a:srgbClr val="000000"/>
                     </a:solidFill>
@@ -10440,7 +10442,7 @@
               </a:ln>
               <a:extLst>
                 <a:ext uri="{91240B29-F687-4f45-9708-019B960494DF}">
-                  <a14:hiddenLine xmlns:a14="http://schemas.microsoft.com/office/drawing/2010/main" xmlns="" w="9525">
+                  <a14:hiddenLine xmlns="" xmlns:a14="http://schemas.microsoft.com/office/drawing/2010/main" w="9525">
                     <a:solidFill>
                       <a:srgbClr val="000000"/>
                     </a:solidFill>
@@ -10502,7 +10504,7 @@
               </a:ln>
               <a:extLst>
                 <a:ext uri="{91240B29-F687-4f45-9708-019B960494DF}">
-                  <a14:hiddenLine xmlns:a14="http://schemas.microsoft.com/office/drawing/2010/main" xmlns="" w="9525">
+                  <a14:hiddenLine xmlns="" xmlns:a14="http://schemas.microsoft.com/office/drawing/2010/main" w="9525">
                     <a:solidFill>
                       <a:srgbClr val="000000"/>
                     </a:solidFill>
@@ -10592,7 +10594,7 @@
               </a:ln>
               <a:extLst>
                 <a:ext uri="{91240B29-F687-4f45-9708-019B960494DF}">
-                  <a14:hiddenLine xmlns:a14="http://schemas.microsoft.com/office/drawing/2010/main" xmlns="" w="9525">
+                  <a14:hiddenLine xmlns="" xmlns:a14="http://schemas.microsoft.com/office/drawing/2010/main" w="9525">
                     <a:solidFill>
                       <a:srgbClr val="000000"/>
                     </a:solidFill>
@@ -10657,7 +10659,7 @@
               </a:ln>
               <a:extLst>
                 <a:ext uri="{91240B29-F687-4f45-9708-019B960494DF}">
-                  <a14:hiddenLine xmlns:a14="http://schemas.microsoft.com/office/drawing/2010/main" xmlns="" w="9525">
+                  <a14:hiddenLine xmlns="" xmlns:a14="http://schemas.microsoft.com/office/drawing/2010/main" w="9525">
                     <a:solidFill>
                       <a:srgbClr val="000000"/>
                     </a:solidFill>
@@ -10719,7 +10721,7 @@
               </a:ln>
               <a:extLst>
                 <a:ext uri="{91240B29-F687-4f45-9708-019B960494DF}">
-                  <a14:hiddenLine xmlns:a14="http://schemas.microsoft.com/office/drawing/2010/main" xmlns="" w="9525">
+                  <a14:hiddenLine xmlns="" xmlns:a14="http://schemas.microsoft.com/office/drawing/2010/main" w="9525">
                     <a:solidFill>
                       <a:srgbClr val="000000"/>
                     </a:solidFill>
@@ -10809,7 +10811,7 @@
               </a:ln>
               <a:extLst>
                 <a:ext uri="{91240B29-F687-4f45-9708-019B960494DF}">
-                  <a14:hiddenLine xmlns:a14="http://schemas.microsoft.com/office/drawing/2010/main" xmlns="" w="9525">
+                  <a14:hiddenLine xmlns="" xmlns:a14="http://schemas.microsoft.com/office/drawing/2010/main" w="9525">
                     <a:solidFill>
                       <a:srgbClr val="000000"/>
                     </a:solidFill>
@@ -10899,7 +10901,7 @@
               </a:ln>
               <a:extLst>
                 <a:ext uri="{91240B29-F687-4f45-9708-019B960494DF}">
-                  <a14:hiddenLine xmlns:a14="http://schemas.microsoft.com/office/drawing/2010/main" xmlns="" w="9525">
+                  <a14:hiddenLine xmlns="" xmlns:a14="http://schemas.microsoft.com/office/drawing/2010/main" w="9525">
                     <a:solidFill>
                       <a:srgbClr val="000000"/>
                     </a:solidFill>
@@ -10964,7 +10966,7 @@
               </a:ln>
               <a:extLst>
                 <a:ext uri="{91240B29-F687-4f45-9708-019B960494DF}">
-                  <a14:hiddenLine xmlns:a14="http://schemas.microsoft.com/office/drawing/2010/main" xmlns="" w="9525">
+                  <a14:hiddenLine xmlns="" xmlns:a14="http://schemas.microsoft.com/office/drawing/2010/main" w="9525">
                     <a:solidFill>
                       <a:srgbClr val="000000"/>
                     </a:solidFill>
@@ -11084,7 +11086,7 @@
               </a:ln>
               <a:extLst>
                 <a:ext uri="{91240B29-F687-4f45-9708-019B960494DF}">
-                  <a14:hiddenLine xmlns:a14="http://schemas.microsoft.com/office/drawing/2010/main" xmlns="" w="9525">
+                  <a14:hiddenLine xmlns="" xmlns:a14="http://schemas.microsoft.com/office/drawing/2010/main" w="9525">
                     <a:solidFill>
                       <a:srgbClr val="000000"/>
                     </a:solidFill>
@@ -11165,7 +11167,7 @@
               </a:ln>
               <a:extLst>
                 <a:ext uri="{91240B29-F687-4f45-9708-019B960494DF}">
-                  <a14:hiddenLine xmlns:a14="http://schemas.microsoft.com/office/drawing/2010/main" xmlns="" w="9525">
+                  <a14:hiddenLine xmlns="" xmlns:a14="http://schemas.microsoft.com/office/drawing/2010/main" w="9525">
                     <a:solidFill>
                       <a:srgbClr val="000000"/>
                     </a:solidFill>
@@ -11280,7 +11282,7 @@
               </a:ln>
               <a:extLst>
                 <a:ext uri="{91240B29-F687-4f45-9708-019B960494DF}">
-                  <a14:hiddenLine xmlns:a14="http://schemas.microsoft.com/office/drawing/2010/main" xmlns="" w="9525">
+                  <a14:hiddenLine xmlns="" xmlns:a14="http://schemas.microsoft.com/office/drawing/2010/main" w="9525">
                     <a:solidFill>
                       <a:srgbClr val="000000"/>
                     </a:solidFill>
@@ -11370,7 +11372,7 @@
               </a:ln>
               <a:extLst>
                 <a:ext uri="{91240B29-F687-4f45-9708-019B960494DF}">
-                  <a14:hiddenLine xmlns:a14="http://schemas.microsoft.com/office/drawing/2010/main" xmlns="" w="9525">
+                  <a14:hiddenLine xmlns="" xmlns:a14="http://schemas.microsoft.com/office/drawing/2010/main" w="9525">
                     <a:solidFill>
                       <a:srgbClr val="000000"/>
                     </a:solidFill>
@@ -11435,7 +11437,7 @@
               </a:ln>
               <a:extLst>
                 <a:ext uri="{91240B29-F687-4f45-9708-019B960494DF}">
-                  <a14:hiddenLine xmlns:a14="http://schemas.microsoft.com/office/drawing/2010/main" xmlns="" w="9525">
+                  <a14:hiddenLine xmlns="" xmlns:a14="http://schemas.microsoft.com/office/drawing/2010/main" w="9525">
                     <a:solidFill>
                       <a:srgbClr val="000000"/>
                     </a:solidFill>
@@ -11525,7 +11527,7 @@
               </a:ln>
               <a:extLst>
                 <a:ext uri="{91240B29-F687-4f45-9708-019B960494DF}">
-                  <a14:hiddenLine xmlns:a14="http://schemas.microsoft.com/office/drawing/2010/main" xmlns="" w="9525">
+                  <a14:hiddenLine xmlns="" xmlns:a14="http://schemas.microsoft.com/office/drawing/2010/main" w="9525">
                     <a:solidFill>
                       <a:srgbClr val="000000"/>
                     </a:solidFill>
@@ -11593,7 +11595,7 @@
               </a:ln>
               <a:extLst>
                 <a:ext uri="{91240B29-F687-4f45-9708-019B960494DF}">
-                  <a14:hiddenLine xmlns:a14="http://schemas.microsoft.com/office/drawing/2010/main" xmlns="" w="9525">
+                  <a14:hiddenLine xmlns="" xmlns:a14="http://schemas.microsoft.com/office/drawing/2010/main" w="9525">
                     <a:solidFill>
                       <a:srgbClr val="000000"/>
                     </a:solidFill>
@@ -11683,7 +11685,7 @@
               </a:ln>
               <a:extLst>
                 <a:ext uri="{91240B29-F687-4f45-9708-019B960494DF}">
-                  <a14:hiddenLine xmlns:a14="http://schemas.microsoft.com/office/drawing/2010/main" xmlns="" w="9525">
+                  <a14:hiddenLine xmlns="" xmlns:a14="http://schemas.microsoft.com/office/drawing/2010/main" w="9525">
                     <a:solidFill>
                       <a:srgbClr val="000000"/>
                     </a:solidFill>
@@ -11751,7 +11753,7 @@
               </a:ln>
               <a:extLst>
                 <a:ext uri="{91240B29-F687-4f45-9708-019B960494DF}">
-                  <a14:hiddenLine xmlns:a14="http://schemas.microsoft.com/office/drawing/2010/main" xmlns="" w="9525">
+                  <a14:hiddenLine xmlns="" xmlns:a14="http://schemas.microsoft.com/office/drawing/2010/main" w="9525">
                     <a:solidFill>
                       <a:srgbClr val="000000"/>
                     </a:solidFill>
@@ -11841,7 +11843,7 @@
               </a:ln>
               <a:extLst>
                 <a:ext uri="{91240B29-F687-4f45-9708-019B960494DF}">
-                  <a14:hiddenLine xmlns:a14="http://schemas.microsoft.com/office/drawing/2010/main" xmlns="" w="9525">
+                  <a14:hiddenLine xmlns="" xmlns:a14="http://schemas.microsoft.com/office/drawing/2010/main" w="9525">
                     <a:solidFill>
                       <a:srgbClr val="000000"/>
                     </a:solidFill>
@@ -11875,7 +11877,7 @@
               </a:ln>
               <a:extLst>
                 <a:ext uri="{91240B29-F687-4f45-9708-019B960494DF}">
-                  <a14:hiddenLine xmlns:a14="http://schemas.microsoft.com/office/drawing/2010/main" xmlns="" w="9525">
+                  <a14:hiddenLine xmlns="" xmlns:a14="http://schemas.microsoft.com/office/drawing/2010/main" w="9525">
                     <a:solidFill>
                       <a:srgbClr val="000000"/>
                     </a:solidFill>
@@ -12584,15 +12586,7 @@
           <a:p>
             <a:r>
               <a:rPr lang="en-US" dirty="0" smtClean="0"/>
-              <a:t>Lesson </a:t>
-            </a:r>
-            <a:r>
-              <a:rPr lang="en-US" dirty="0" smtClean="0"/>
-              <a:t>9:</a:t>
-            </a:r>
-            <a:r>
-              <a:rPr lang="en-US" dirty="0" smtClean="0"/>
-              <a:t/>
+              <a:t>Lesson 9:</a:t>
             </a:r>
             <a:br>
               <a:rPr lang="en-US" dirty="0" smtClean="0"/>
@@ -12702,10 +12696,25 @@
             </a:r>
             <a:r>
               <a:rPr lang="en-US" dirty="0" smtClean="0"/>
-              <a:t> your web site</a:t>
+              <a:t> your web </a:t>
             </a:r>
-          </a:p>
-          <a:p>
+            <a:r>
+              <a:rPr lang="en-US" dirty="0" smtClean="0"/>
+              <a:t>site</a:t>
+            </a:r>
+          </a:p>
+          <a:p>
+            <a:r>
+              <a:rPr lang="en-US" dirty="0" smtClean="0"/>
+              <a:t>Lots of options, but most have some cost</a:t>
+            </a:r>
+          </a:p>
+          <a:p>
+            <a:pPr lvl="1"/>
+            <a:r>
+              <a:rPr lang="en-US" dirty="0" smtClean="0"/>
+              <a:t>Most offer free trials</a:t>
+            </a:r>
             <a:endParaRPr lang="en-US" dirty="0"/>
           </a:p>
         </p:txBody>
@@ -12742,6 +12751,225 @@
       </p:grpSpPr>
       <p:sp>
         <p:nvSpPr>
+          <p:cNvPr id="2" name="Title 1"/>
+          <p:cNvSpPr>
+            <a:spLocks noGrp="1"/>
+          </p:cNvSpPr>
+          <p:nvPr>
+            <p:ph type="title"/>
+          </p:nvPr>
+        </p:nvSpPr>
+        <p:spPr/>
+        <p:txBody>
+          <a:bodyPr/>
+          <a:lstStyle/>
+          <a:p>
+            <a:r>
+              <a:rPr lang="en-US" dirty="0" smtClean="0"/>
+              <a:t>Hosting providers</a:t>
+            </a:r>
+            <a:endParaRPr lang="en-US" dirty="0"/>
+          </a:p>
+        </p:txBody>
+      </p:sp>
+      <p:sp>
+        <p:nvSpPr>
+          <p:cNvPr id="3" name="Content Placeholder 2"/>
+          <p:cNvSpPr>
+            <a:spLocks noGrp="1"/>
+          </p:cNvSpPr>
+          <p:nvPr>
+            <p:ph sz="half" idx="1"/>
+          </p:nvPr>
+        </p:nvSpPr>
+        <p:spPr/>
+        <p:txBody>
+          <a:bodyPr/>
+          <a:lstStyle/>
+          <a:p>
+            <a:r>
+              <a:rPr lang="en-US" dirty="0" smtClean="0"/>
+              <a:t>Microsoft Azure</a:t>
+            </a:r>
+          </a:p>
+          <a:p>
+            <a:r>
+              <a:rPr lang="en-US" dirty="0" err="1" smtClean="0"/>
+              <a:t>GoDaddy</a:t>
+            </a:r>
+            <a:endParaRPr lang="en-US" dirty="0" smtClean="0"/>
+          </a:p>
+          <a:p>
+            <a:r>
+              <a:rPr lang="en-US" dirty="0" smtClean="0"/>
+              <a:t>eHost.com</a:t>
+            </a:r>
+          </a:p>
+          <a:p>
+            <a:r>
+              <a:rPr lang="en-US" dirty="0" smtClean="0"/>
+              <a:t>Etc.</a:t>
+            </a:r>
+            <a:endParaRPr lang="en-US" dirty="0"/>
+          </a:p>
+        </p:txBody>
+      </p:sp>
+      <p:sp>
+        <p:nvSpPr>
+          <p:cNvPr id="4" name="Content Placeholder 3"/>
+          <p:cNvSpPr>
+            <a:spLocks noGrp="1"/>
+          </p:cNvSpPr>
+          <p:nvPr>
+            <p:ph sz="half" idx="2"/>
+          </p:nvPr>
+        </p:nvSpPr>
+        <p:spPr/>
+        <p:txBody>
+          <a:bodyPr/>
+          <a:lstStyle/>
+          <a:p>
+            <a:r>
+              <a:rPr lang="en-US" dirty="0" smtClean="0"/>
+              <a:t>Most cost $5-10 per month</a:t>
+            </a:r>
+            <a:endParaRPr lang="en-US" dirty="0"/>
+          </a:p>
+        </p:txBody>
+      </p:sp>
+    </p:spTree>
+    <p:extLst>
+      <p:ext uri="{BB962C8B-B14F-4D97-AF65-F5344CB8AC3E}">
+        <p14:creationId xmlns:p14="http://schemas.microsoft.com/office/powerpoint/2010/main" val="1444633958"/>
+      </p:ext>
+    </p:extLst>
+  </p:cSld>
+  <p:clrMapOvr>
+    <a:masterClrMapping/>
+  </p:clrMapOvr>
+</p:sld>
+</file>
+
+<file path=ppt/slides/slide5.xml><?xml version="1.0" encoding="utf-8"?>
+<p:sld xmlns:a="http://schemas.openxmlformats.org/drawingml/2006/main" xmlns:r="http://schemas.openxmlformats.org/officeDocument/2006/relationships" xmlns:p="http://schemas.openxmlformats.org/presentationml/2006/main">
+  <p:cSld>
+    <p:spTree>
+      <p:nvGrpSpPr>
+        <p:cNvPr id="1" name=""/>
+        <p:cNvGrpSpPr/>
+        <p:nvPr/>
+      </p:nvGrpSpPr>
+      <p:grpSpPr>
+        <a:xfrm>
+          <a:off x="0" y="0"/>
+          <a:ext cx="0" cy="0"/>
+          <a:chOff x="0" y="0"/>
+          <a:chExt cx="0" cy="0"/>
+        </a:xfrm>
+      </p:grpSpPr>
+      <p:sp>
+        <p:nvSpPr>
+          <p:cNvPr id="2" name="Title 1"/>
+          <p:cNvSpPr>
+            <a:spLocks noGrp="1"/>
+          </p:cNvSpPr>
+          <p:nvPr>
+            <p:ph type="title"/>
+          </p:nvPr>
+        </p:nvSpPr>
+        <p:spPr/>
+        <p:txBody>
+          <a:bodyPr/>
+          <a:lstStyle/>
+          <a:p>
+            <a:r>
+              <a:rPr lang="en-US" dirty="0" smtClean="0"/>
+              <a:t>Custom Domain Names</a:t>
+            </a:r>
+            <a:endParaRPr lang="en-US" dirty="0"/>
+          </a:p>
+        </p:txBody>
+      </p:sp>
+      <p:sp>
+        <p:nvSpPr>
+          <p:cNvPr id="5" name="Content Placeholder 4"/>
+          <p:cNvSpPr>
+            <a:spLocks noGrp="1"/>
+          </p:cNvSpPr>
+          <p:nvPr>
+            <p:ph idx="1"/>
+          </p:nvPr>
+        </p:nvSpPr>
+        <p:spPr/>
+        <p:txBody>
+          <a:bodyPr/>
+          <a:lstStyle/>
+          <a:p>
+            <a:r>
+              <a:rPr lang="en-US" dirty="0" smtClean="0"/>
+              <a:t>Without a custom domain name, your website address might be</a:t>
+            </a:r>
+            <a:br>
+              <a:rPr lang="en-US" dirty="0" smtClean="0"/>
+            </a:br>
+            <a:r>
+              <a:rPr lang="en-US" dirty="0" smtClean="0"/>
+              <a:t>my-cool-site.godaddy.com</a:t>
+            </a:r>
+          </a:p>
+          <a:p>
+            <a:r>
+              <a:rPr lang="en-US" dirty="0" smtClean="0"/>
+              <a:t>With a custom domain name, your website address can be</a:t>
+            </a:r>
+            <a:br>
+              <a:rPr lang="en-US" dirty="0" smtClean="0"/>
+            </a:br>
+            <a:r>
+              <a:rPr lang="en-US" dirty="0" smtClean="0"/>
+              <a:t>my-cool-site.com</a:t>
+            </a:r>
+          </a:p>
+          <a:p>
+            <a:r>
+              <a:rPr lang="en-US" dirty="0" smtClean="0"/>
+              <a:t>Usually costs $15/year</a:t>
+            </a:r>
+          </a:p>
+        </p:txBody>
+      </p:sp>
+    </p:spTree>
+    <p:extLst>
+      <p:ext uri="{BB962C8B-B14F-4D97-AF65-F5344CB8AC3E}">
+        <p14:creationId xmlns:p14="http://schemas.microsoft.com/office/powerpoint/2010/main" val="1249768164"/>
+      </p:ext>
+    </p:extLst>
+  </p:cSld>
+  <p:clrMapOvr>
+    <a:masterClrMapping/>
+  </p:clrMapOvr>
+</p:sld>
+</file>
+
+<file path=ppt/slides/slide6.xml><?xml version="1.0" encoding="utf-8"?>
+<p:sld xmlns:a="http://schemas.openxmlformats.org/drawingml/2006/main" xmlns:r="http://schemas.openxmlformats.org/officeDocument/2006/relationships" xmlns:p="http://schemas.openxmlformats.org/presentationml/2006/main">
+  <p:cSld>
+    <p:spTree>
+      <p:nvGrpSpPr>
+        <p:cNvPr id="1" name=""/>
+        <p:cNvGrpSpPr/>
+        <p:nvPr/>
+      </p:nvGrpSpPr>
+      <p:grpSpPr>
+        <a:xfrm>
+          <a:off x="0" y="0"/>
+          <a:ext cx="0" cy="0"/>
+          <a:chOff x="0" y="0"/>
+          <a:chExt cx="0" cy="0"/>
+        </a:xfrm>
+      </p:grpSpPr>
+      <p:sp>
+        <p:nvSpPr>
           <p:cNvPr id="5" name="Title 4"/>
           <p:cNvSpPr>
             <a:spLocks noGrp="1"/>
@@ -12757,11 +12985,7 @@
           <a:p>
             <a:r>
               <a:rPr lang="en-US" dirty="0" smtClean="0"/>
-              <a:t>Exercise </a:t>
-            </a:r>
-            <a:r>
-              <a:rPr lang="en-US" dirty="0" smtClean="0"/>
-              <a:t>9</a:t>
+              <a:t>Exercise 9</a:t>
             </a:r>
             <a:endParaRPr lang="en-US" dirty="0"/>
           </a:p>

</xml_diff>

<commit_message>
Added Azure website link to presentation
</commit_message>
<xml_diff>
--- a/Slides/Lesson 9.pptx
+++ b/Slides/Lesson 9.pptx
@@ -174,7 +174,7 @@
           <a:noFill/>
           <a:extLst>
             <a:ext uri="{909E8E84-426E-40dd-AFC4-6F175D3DCCD1}">
-              <a14:hiddenFill xmlns="" xmlns:a14="http://schemas.microsoft.com/office/drawing/2010/main">
+              <a14:hiddenFill xmlns:a14="http://schemas.microsoft.com/office/drawing/2010/main" xmlns="">
                 <a:solidFill>
                   <a:srgbClr val="FFFFFF"/>
                 </a:solidFill>
@@ -233,7 +233,7 @@
             </a:ln>
             <a:extLst>
               <a:ext uri="{91240B29-F687-4f45-9708-019B960494DF}">
-                <a14:hiddenLine xmlns="" xmlns:a14="http://schemas.microsoft.com/office/drawing/2010/main" w="9525">
+                <a14:hiddenLine xmlns:a14="http://schemas.microsoft.com/office/drawing/2010/main" xmlns="" w="9525">
                   <a:solidFill>
                     <a:srgbClr val="000000"/>
                   </a:solidFill>
@@ -323,7 +323,7 @@
             </a:ln>
             <a:extLst>
               <a:ext uri="{91240B29-F687-4f45-9708-019B960494DF}">
-                <a14:hiddenLine xmlns="" xmlns:a14="http://schemas.microsoft.com/office/drawing/2010/main" w="9525">
+                <a14:hiddenLine xmlns:a14="http://schemas.microsoft.com/office/drawing/2010/main" xmlns="" w="9525">
                   <a:solidFill>
                     <a:srgbClr val="000000"/>
                   </a:solidFill>
@@ -413,7 +413,7 @@
             </a:ln>
             <a:extLst>
               <a:ext uri="{91240B29-F687-4f45-9708-019B960494DF}">
-                <a14:hiddenLine xmlns="" xmlns:a14="http://schemas.microsoft.com/office/drawing/2010/main" w="9525">
+                <a14:hiddenLine xmlns:a14="http://schemas.microsoft.com/office/drawing/2010/main" xmlns="" w="9525">
                   <a:solidFill>
                     <a:srgbClr val="000000"/>
                   </a:solidFill>
@@ -447,7 +447,7 @@
             </a:ln>
             <a:extLst>
               <a:ext uri="{91240B29-F687-4f45-9708-019B960494DF}">
-                <a14:hiddenLine xmlns="" xmlns:a14="http://schemas.microsoft.com/office/drawing/2010/main" w="9525">
+                <a14:hiddenLine xmlns:a14="http://schemas.microsoft.com/office/drawing/2010/main" xmlns="" w="9525">
                   <a:solidFill>
                     <a:srgbClr val="000000"/>
                   </a:solidFill>
@@ -537,7 +537,7 @@
             </a:ln>
             <a:extLst>
               <a:ext uri="{91240B29-F687-4f45-9708-019B960494DF}">
-                <a14:hiddenLine xmlns="" xmlns:a14="http://schemas.microsoft.com/office/drawing/2010/main" w="9525">
+                <a14:hiddenLine xmlns:a14="http://schemas.microsoft.com/office/drawing/2010/main" xmlns="" w="9525">
                   <a:solidFill>
                     <a:srgbClr val="000000"/>
                   </a:solidFill>
@@ -599,7 +599,7 @@
             </a:ln>
             <a:extLst>
               <a:ext uri="{91240B29-F687-4f45-9708-019B960494DF}">
-                <a14:hiddenLine xmlns="" xmlns:a14="http://schemas.microsoft.com/office/drawing/2010/main" w="9525">
+                <a14:hiddenLine xmlns:a14="http://schemas.microsoft.com/office/drawing/2010/main" xmlns="" w="9525">
                   <a:solidFill>
                     <a:srgbClr val="000000"/>
                   </a:solidFill>
@@ -661,7 +661,7 @@
             </a:ln>
             <a:extLst>
               <a:ext uri="{91240B29-F687-4f45-9708-019B960494DF}">
-                <a14:hiddenLine xmlns="" xmlns:a14="http://schemas.microsoft.com/office/drawing/2010/main" w="9525">
+                <a14:hiddenLine xmlns:a14="http://schemas.microsoft.com/office/drawing/2010/main" xmlns="" w="9525">
                   <a:solidFill>
                     <a:srgbClr val="000000"/>
                   </a:solidFill>
@@ -751,7 +751,7 @@
             </a:ln>
             <a:extLst>
               <a:ext uri="{91240B29-F687-4f45-9708-019B960494DF}">
-                <a14:hiddenLine xmlns="" xmlns:a14="http://schemas.microsoft.com/office/drawing/2010/main" w="9525">
+                <a14:hiddenLine xmlns:a14="http://schemas.microsoft.com/office/drawing/2010/main" xmlns="" w="9525">
                   <a:solidFill>
                     <a:srgbClr val="000000"/>
                   </a:solidFill>
@@ -813,7 +813,7 @@
             </a:ln>
             <a:extLst>
               <a:ext uri="{91240B29-F687-4f45-9708-019B960494DF}">
-                <a14:hiddenLine xmlns="" xmlns:a14="http://schemas.microsoft.com/office/drawing/2010/main" w="9525">
+                <a14:hiddenLine xmlns:a14="http://schemas.microsoft.com/office/drawing/2010/main" xmlns="" w="9525">
                   <a:solidFill>
                     <a:srgbClr val="000000"/>
                   </a:solidFill>
@@ -875,7 +875,7 @@
             </a:ln>
             <a:extLst>
               <a:ext uri="{91240B29-F687-4f45-9708-019B960494DF}">
-                <a14:hiddenLine xmlns="" xmlns:a14="http://schemas.microsoft.com/office/drawing/2010/main" w="9525">
+                <a14:hiddenLine xmlns:a14="http://schemas.microsoft.com/office/drawing/2010/main" xmlns="" w="9525">
                   <a:solidFill>
                     <a:srgbClr val="000000"/>
                   </a:solidFill>
@@ -965,7 +965,7 @@
             </a:ln>
             <a:extLst>
               <a:ext uri="{91240B29-F687-4f45-9708-019B960494DF}">
-                <a14:hiddenLine xmlns="" xmlns:a14="http://schemas.microsoft.com/office/drawing/2010/main" w="9525">
+                <a14:hiddenLine xmlns:a14="http://schemas.microsoft.com/office/drawing/2010/main" xmlns="" w="9525">
                   <a:solidFill>
                     <a:srgbClr val="000000"/>
                   </a:solidFill>
@@ -1055,7 +1055,7 @@
             </a:ln>
             <a:extLst>
               <a:ext uri="{91240B29-F687-4f45-9708-019B960494DF}">
-                <a14:hiddenLine xmlns="" xmlns:a14="http://schemas.microsoft.com/office/drawing/2010/main" w="9525">
+                <a14:hiddenLine xmlns:a14="http://schemas.microsoft.com/office/drawing/2010/main" xmlns="" w="9525">
                   <a:solidFill>
                     <a:srgbClr val="000000"/>
                   </a:solidFill>
@@ -1117,7 +1117,7 @@
             </a:ln>
             <a:extLst>
               <a:ext uri="{91240B29-F687-4f45-9708-019B960494DF}">
-                <a14:hiddenLine xmlns="" xmlns:a14="http://schemas.microsoft.com/office/drawing/2010/main" w="9525">
+                <a14:hiddenLine xmlns:a14="http://schemas.microsoft.com/office/drawing/2010/main" xmlns="" w="9525">
                   <a:solidFill>
                     <a:srgbClr val="000000"/>
                   </a:solidFill>
@@ -1227,7 +1227,7 @@
             </a:ln>
             <a:extLst>
               <a:ext uri="{91240B29-F687-4f45-9708-019B960494DF}">
-                <a14:hiddenLine xmlns="" xmlns:a14="http://schemas.microsoft.com/office/drawing/2010/main" w="9525">
+                <a14:hiddenLine xmlns:a14="http://schemas.microsoft.com/office/drawing/2010/main" xmlns="" w="9525">
                   <a:solidFill>
                     <a:srgbClr val="000000"/>
                   </a:solidFill>
@@ -1289,7 +1289,7 @@
             </a:ln>
             <a:extLst>
               <a:ext uri="{91240B29-F687-4f45-9708-019B960494DF}">
-                <a14:hiddenLine xmlns="" xmlns:a14="http://schemas.microsoft.com/office/drawing/2010/main" w="9525">
+                <a14:hiddenLine xmlns:a14="http://schemas.microsoft.com/office/drawing/2010/main" xmlns="" w="9525">
                   <a:solidFill>
                     <a:srgbClr val="000000"/>
                   </a:solidFill>
@@ -1379,7 +1379,7 @@
             </a:ln>
             <a:extLst>
               <a:ext uri="{91240B29-F687-4f45-9708-019B960494DF}">
-                <a14:hiddenLine xmlns="" xmlns:a14="http://schemas.microsoft.com/office/drawing/2010/main" w="9525">
+                <a14:hiddenLine xmlns:a14="http://schemas.microsoft.com/office/drawing/2010/main" xmlns="" w="9525">
                   <a:solidFill>
                     <a:srgbClr val="000000"/>
                   </a:solidFill>
@@ -1469,7 +1469,7 @@
             </a:ln>
             <a:extLst>
               <a:ext uri="{91240B29-F687-4f45-9708-019B960494DF}">
-                <a14:hiddenLine xmlns="" xmlns:a14="http://schemas.microsoft.com/office/drawing/2010/main" w="9525">
+                <a14:hiddenLine xmlns:a14="http://schemas.microsoft.com/office/drawing/2010/main" xmlns="" w="9525">
                   <a:solidFill>
                     <a:srgbClr val="000000"/>
                   </a:solidFill>
@@ -1531,7 +1531,7 @@
             </a:ln>
             <a:extLst>
               <a:ext uri="{91240B29-F687-4f45-9708-019B960494DF}">
-                <a14:hiddenLine xmlns="" xmlns:a14="http://schemas.microsoft.com/office/drawing/2010/main" w="9525">
+                <a14:hiddenLine xmlns:a14="http://schemas.microsoft.com/office/drawing/2010/main" xmlns="" w="9525">
                   <a:solidFill>
                     <a:srgbClr val="000000"/>
                   </a:solidFill>
@@ -1621,7 +1621,7 @@
             </a:ln>
             <a:extLst>
               <a:ext uri="{91240B29-F687-4f45-9708-019B960494DF}">
-                <a14:hiddenLine xmlns="" xmlns:a14="http://schemas.microsoft.com/office/drawing/2010/main" w="9525">
+                <a14:hiddenLine xmlns:a14="http://schemas.microsoft.com/office/drawing/2010/main" xmlns="" w="9525">
                   <a:solidFill>
                     <a:srgbClr val="000000"/>
                   </a:solidFill>
@@ -1711,7 +1711,7 @@
             </a:ln>
             <a:extLst>
               <a:ext uri="{91240B29-F687-4f45-9708-019B960494DF}">
-                <a14:hiddenLine xmlns="" xmlns:a14="http://schemas.microsoft.com/office/drawing/2010/main" w="9525">
+                <a14:hiddenLine xmlns:a14="http://schemas.microsoft.com/office/drawing/2010/main" xmlns="" w="9525">
                   <a:solidFill>
                     <a:srgbClr val="000000"/>
                   </a:solidFill>
@@ -1767,7 +1767,7 @@
             </a:ln>
             <a:extLst>
               <a:ext uri="{91240B29-F687-4f45-9708-019B960494DF}">
-                <a14:hiddenLine xmlns="" xmlns:a14="http://schemas.microsoft.com/office/drawing/2010/main" w="9525">
+                <a14:hiddenLine xmlns:a14="http://schemas.microsoft.com/office/drawing/2010/main" xmlns="" w="9525">
                   <a:solidFill>
                     <a:srgbClr val="000000"/>
                   </a:solidFill>
@@ -1857,7 +1857,7 @@
             </a:ln>
             <a:extLst>
               <a:ext uri="{91240B29-F687-4f45-9708-019B960494DF}">
-                <a14:hiddenLine xmlns="" xmlns:a14="http://schemas.microsoft.com/office/drawing/2010/main" w="9525">
+                <a14:hiddenLine xmlns:a14="http://schemas.microsoft.com/office/drawing/2010/main" xmlns="" w="9525">
                   <a:solidFill>
                     <a:srgbClr val="000000"/>
                   </a:solidFill>
@@ -1913,7 +1913,7 @@
             </a:ln>
             <a:extLst>
               <a:ext uri="{91240B29-F687-4f45-9708-019B960494DF}">
-                <a14:hiddenLine xmlns="" xmlns:a14="http://schemas.microsoft.com/office/drawing/2010/main" w="9525">
+                <a14:hiddenLine xmlns:a14="http://schemas.microsoft.com/office/drawing/2010/main" xmlns="" w="9525">
                   <a:solidFill>
                     <a:srgbClr val="000000"/>
                   </a:solidFill>
@@ -2003,7 +2003,7 @@
             </a:ln>
             <a:extLst>
               <a:ext uri="{91240B29-F687-4f45-9708-019B960494DF}">
-                <a14:hiddenLine xmlns="" xmlns:a14="http://schemas.microsoft.com/office/drawing/2010/main" w="9525">
+                <a14:hiddenLine xmlns:a14="http://schemas.microsoft.com/office/drawing/2010/main" xmlns="" w="9525">
                   <a:solidFill>
                     <a:srgbClr val="000000"/>
                   </a:solidFill>
@@ -2071,7 +2071,7 @@
             </a:ln>
             <a:extLst>
               <a:ext uri="{91240B29-F687-4f45-9708-019B960494DF}">
-                <a14:hiddenLine xmlns="" xmlns:a14="http://schemas.microsoft.com/office/drawing/2010/main" w="9525">
+                <a14:hiddenLine xmlns:a14="http://schemas.microsoft.com/office/drawing/2010/main" xmlns="" w="9525">
                   <a:solidFill>
                     <a:srgbClr val="000000"/>
                   </a:solidFill>
@@ -2161,7 +2161,7 @@
             </a:ln>
             <a:extLst>
               <a:ext uri="{91240B29-F687-4f45-9708-019B960494DF}">
-                <a14:hiddenLine xmlns="" xmlns:a14="http://schemas.microsoft.com/office/drawing/2010/main" w="9525">
+                <a14:hiddenLine xmlns:a14="http://schemas.microsoft.com/office/drawing/2010/main" xmlns="" w="9525">
                   <a:solidFill>
                     <a:srgbClr val="000000"/>
                   </a:solidFill>
@@ -2229,7 +2229,7 @@
             </a:ln>
             <a:extLst>
               <a:ext uri="{91240B29-F687-4f45-9708-019B960494DF}">
-                <a14:hiddenLine xmlns="" xmlns:a14="http://schemas.microsoft.com/office/drawing/2010/main" w="9525">
+                <a14:hiddenLine xmlns:a14="http://schemas.microsoft.com/office/drawing/2010/main" xmlns="" w="9525">
                   <a:solidFill>
                     <a:srgbClr val="000000"/>
                   </a:solidFill>
@@ -2319,7 +2319,7 @@
             </a:ln>
             <a:extLst>
               <a:ext uri="{91240B29-F687-4f45-9708-019B960494DF}">
-                <a14:hiddenLine xmlns="" xmlns:a14="http://schemas.microsoft.com/office/drawing/2010/main" w="9525">
+                <a14:hiddenLine xmlns:a14="http://schemas.microsoft.com/office/drawing/2010/main" xmlns="" w="9525">
                   <a:solidFill>
                     <a:srgbClr val="000000"/>
                   </a:solidFill>
@@ -2353,7 +2353,7 @@
             </a:ln>
             <a:extLst>
               <a:ext uri="{91240B29-F687-4f45-9708-019B960494DF}">
-                <a14:hiddenLine xmlns="" xmlns:a14="http://schemas.microsoft.com/office/drawing/2010/main" w="9525">
+                <a14:hiddenLine xmlns:a14="http://schemas.microsoft.com/office/drawing/2010/main" xmlns="" w="9525">
                   <a:solidFill>
                     <a:srgbClr val="000000"/>
                   </a:solidFill>
@@ -2443,7 +2443,7 @@
             </a:ln>
             <a:extLst>
               <a:ext uri="{91240B29-F687-4f45-9708-019B960494DF}">
-                <a14:hiddenLine xmlns="" xmlns:a14="http://schemas.microsoft.com/office/drawing/2010/main" w="9525">
+                <a14:hiddenLine xmlns:a14="http://schemas.microsoft.com/office/drawing/2010/main" xmlns="" w="9525">
                   <a:solidFill>
                     <a:srgbClr val="000000"/>
                   </a:solidFill>
@@ -2505,7 +2505,7 @@
             </a:ln>
             <a:extLst>
               <a:ext uri="{91240B29-F687-4f45-9708-019B960494DF}">
-                <a14:hiddenLine xmlns="" xmlns:a14="http://schemas.microsoft.com/office/drawing/2010/main" w="9525">
+                <a14:hiddenLine xmlns:a14="http://schemas.microsoft.com/office/drawing/2010/main" xmlns="" w="9525">
                   <a:solidFill>
                     <a:srgbClr val="000000"/>
                   </a:solidFill>
@@ -2567,7 +2567,7 @@
             </a:ln>
             <a:extLst>
               <a:ext uri="{91240B29-F687-4f45-9708-019B960494DF}">
-                <a14:hiddenLine xmlns="" xmlns:a14="http://schemas.microsoft.com/office/drawing/2010/main" w="9525">
+                <a14:hiddenLine xmlns:a14="http://schemas.microsoft.com/office/drawing/2010/main" xmlns="" w="9525">
                   <a:solidFill>
                     <a:srgbClr val="000000"/>
                   </a:solidFill>
@@ -2657,7 +2657,7 @@
             </a:ln>
             <a:extLst>
               <a:ext uri="{91240B29-F687-4f45-9708-019B960494DF}">
-                <a14:hiddenLine xmlns="" xmlns:a14="http://schemas.microsoft.com/office/drawing/2010/main" w="9525">
+                <a14:hiddenLine xmlns:a14="http://schemas.microsoft.com/office/drawing/2010/main" xmlns="" w="9525">
                   <a:solidFill>
                     <a:srgbClr val="000000"/>
                   </a:solidFill>
@@ -2725,7 +2725,7 @@
             </a:ln>
             <a:extLst>
               <a:ext uri="{91240B29-F687-4f45-9708-019B960494DF}">
-                <a14:hiddenLine xmlns="" xmlns:a14="http://schemas.microsoft.com/office/drawing/2010/main" w="9525">
+                <a14:hiddenLine xmlns:a14="http://schemas.microsoft.com/office/drawing/2010/main" xmlns="" w="9525">
                   <a:solidFill>
                     <a:srgbClr val="000000"/>
                   </a:solidFill>
@@ -2787,7 +2787,7 @@
             </a:ln>
             <a:extLst>
               <a:ext uri="{91240B29-F687-4f45-9708-019B960494DF}">
-                <a14:hiddenLine xmlns="" xmlns:a14="http://schemas.microsoft.com/office/drawing/2010/main" w="9525">
+                <a14:hiddenLine xmlns:a14="http://schemas.microsoft.com/office/drawing/2010/main" xmlns="" w="9525">
                   <a:solidFill>
                     <a:srgbClr val="000000"/>
                   </a:solidFill>
@@ -2877,7 +2877,7 @@
             </a:ln>
             <a:extLst>
               <a:ext uri="{91240B29-F687-4f45-9708-019B960494DF}">
-                <a14:hiddenLine xmlns="" xmlns:a14="http://schemas.microsoft.com/office/drawing/2010/main" w="9525">
+                <a14:hiddenLine xmlns:a14="http://schemas.microsoft.com/office/drawing/2010/main" xmlns="" w="9525">
                   <a:solidFill>
                     <a:srgbClr val="000000"/>
                   </a:solidFill>
@@ -2939,7 +2939,7 @@
             </a:ln>
             <a:extLst>
               <a:ext uri="{91240B29-F687-4f45-9708-019B960494DF}">
-                <a14:hiddenLine xmlns="" xmlns:a14="http://schemas.microsoft.com/office/drawing/2010/main" w="9525">
+                <a14:hiddenLine xmlns:a14="http://schemas.microsoft.com/office/drawing/2010/main" xmlns="" w="9525">
                   <a:solidFill>
                     <a:srgbClr val="000000"/>
                   </a:solidFill>
@@ -3029,7 +3029,7 @@
             </a:ln>
             <a:extLst>
               <a:ext uri="{91240B29-F687-4f45-9708-019B960494DF}">
-                <a14:hiddenLine xmlns="" xmlns:a14="http://schemas.microsoft.com/office/drawing/2010/main" w="9525">
+                <a14:hiddenLine xmlns:a14="http://schemas.microsoft.com/office/drawing/2010/main" xmlns="" w="9525">
                   <a:solidFill>
                     <a:srgbClr val="000000"/>
                   </a:solidFill>
@@ -3091,7 +3091,7 @@
             </a:ln>
             <a:extLst>
               <a:ext uri="{91240B29-F687-4f45-9708-019B960494DF}">
-                <a14:hiddenLine xmlns="" xmlns:a14="http://schemas.microsoft.com/office/drawing/2010/main" w="9525">
+                <a14:hiddenLine xmlns:a14="http://schemas.microsoft.com/office/drawing/2010/main" xmlns="" w="9525">
                   <a:solidFill>
                     <a:srgbClr val="000000"/>
                   </a:solidFill>
@@ -3181,7 +3181,7 @@
             </a:ln>
             <a:extLst>
               <a:ext uri="{91240B29-F687-4f45-9708-019B960494DF}">
-                <a14:hiddenLine xmlns="" xmlns:a14="http://schemas.microsoft.com/office/drawing/2010/main" w="9525">
+                <a14:hiddenLine xmlns:a14="http://schemas.microsoft.com/office/drawing/2010/main" xmlns="" w="9525">
                   <a:solidFill>
                     <a:srgbClr val="000000"/>
                   </a:solidFill>
@@ -3215,7 +3215,7 @@
             </a:ln>
             <a:extLst>
               <a:ext uri="{91240B29-F687-4f45-9708-019B960494DF}">
-                <a14:hiddenLine xmlns="" xmlns:a14="http://schemas.microsoft.com/office/drawing/2010/main" w="9525">
+                <a14:hiddenLine xmlns:a14="http://schemas.microsoft.com/office/drawing/2010/main" xmlns="" w="9525">
                   <a:solidFill>
                     <a:srgbClr val="000000"/>
                   </a:solidFill>
@@ -3280,7 +3280,7 @@
             </a:ln>
             <a:extLst>
               <a:ext uri="{91240B29-F687-4f45-9708-019B960494DF}">
-                <a14:hiddenLine xmlns="" xmlns:a14="http://schemas.microsoft.com/office/drawing/2010/main" w="9525">
+                <a14:hiddenLine xmlns:a14="http://schemas.microsoft.com/office/drawing/2010/main" xmlns="" w="9525">
                   <a:solidFill>
                     <a:srgbClr val="000000"/>
                   </a:solidFill>
@@ -3370,7 +3370,7 @@
             </a:ln>
             <a:extLst>
               <a:ext uri="{91240B29-F687-4f45-9708-019B960494DF}">
-                <a14:hiddenLine xmlns="" xmlns:a14="http://schemas.microsoft.com/office/drawing/2010/main" w="9525">
+                <a14:hiddenLine xmlns:a14="http://schemas.microsoft.com/office/drawing/2010/main" xmlns="" w="9525">
                   <a:solidFill>
                     <a:srgbClr val="000000"/>
                   </a:solidFill>
@@ -3432,7 +3432,7 @@
             </a:ln>
             <a:extLst>
               <a:ext uri="{91240B29-F687-4f45-9708-019B960494DF}">
-                <a14:hiddenLine xmlns="" xmlns:a14="http://schemas.microsoft.com/office/drawing/2010/main" w="9525">
+                <a14:hiddenLine xmlns:a14="http://schemas.microsoft.com/office/drawing/2010/main" xmlns="" w="9525">
                   <a:solidFill>
                     <a:srgbClr val="000000"/>
                   </a:solidFill>
@@ -3522,7 +3522,7 @@
             </a:ln>
             <a:extLst>
               <a:ext uri="{91240B29-F687-4f45-9708-019B960494DF}">
-                <a14:hiddenLine xmlns="" xmlns:a14="http://schemas.microsoft.com/office/drawing/2010/main" w="9525">
+                <a14:hiddenLine xmlns:a14="http://schemas.microsoft.com/office/drawing/2010/main" xmlns="" w="9525">
                   <a:solidFill>
                     <a:srgbClr val="000000"/>
                   </a:solidFill>
@@ -3612,7 +3612,7 @@
             </a:ln>
             <a:extLst>
               <a:ext uri="{91240B29-F687-4f45-9708-019B960494DF}">
-                <a14:hiddenLine xmlns="" xmlns:a14="http://schemas.microsoft.com/office/drawing/2010/main" w="9525">
+                <a14:hiddenLine xmlns:a14="http://schemas.microsoft.com/office/drawing/2010/main" xmlns="" w="9525">
                   <a:solidFill>
                     <a:srgbClr val="000000"/>
                   </a:solidFill>
@@ -3677,7 +3677,7 @@
             </a:ln>
             <a:extLst>
               <a:ext uri="{91240B29-F687-4f45-9708-019B960494DF}">
-                <a14:hiddenLine xmlns="" xmlns:a14="http://schemas.microsoft.com/office/drawing/2010/main" w="9525">
+                <a14:hiddenLine xmlns:a14="http://schemas.microsoft.com/office/drawing/2010/main" xmlns="" w="9525">
                   <a:solidFill>
                     <a:srgbClr val="000000"/>
                   </a:solidFill>
@@ -3739,7 +3739,7 @@
             </a:ln>
             <a:extLst>
               <a:ext uri="{91240B29-F687-4f45-9708-019B960494DF}">
-                <a14:hiddenLine xmlns="" xmlns:a14="http://schemas.microsoft.com/office/drawing/2010/main" w="9525">
+                <a14:hiddenLine xmlns:a14="http://schemas.microsoft.com/office/drawing/2010/main" xmlns="" w="9525">
                   <a:solidFill>
                     <a:srgbClr val="000000"/>
                   </a:solidFill>
@@ -3829,7 +3829,7 @@
             </a:ln>
             <a:extLst>
               <a:ext uri="{91240B29-F687-4f45-9708-019B960494DF}">
-                <a14:hiddenLine xmlns="" xmlns:a14="http://schemas.microsoft.com/office/drawing/2010/main" w="9525">
+                <a14:hiddenLine xmlns:a14="http://schemas.microsoft.com/office/drawing/2010/main" xmlns="" w="9525">
                   <a:solidFill>
                     <a:srgbClr val="000000"/>
                   </a:solidFill>
@@ -3919,7 +3919,7 @@
             </a:ln>
             <a:extLst>
               <a:ext uri="{91240B29-F687-4f45-9708-019B960494DF}">
-                <a14:hiddenLine xmlns="" xmlns:a14="http://schemas.microsoft.com/office/drawing/2010/main" w="9525">
+                <a14:hiddenLine xmlns:a14="http://schemas.microsoft.com/office/drawing/2010/main" xmlns="" w="9525">
                   <a:solidFill>
                     <a:srgbClr val="000000"/>
                   </a:solidFill>
@@ -3981,7 +3981,7 @@
             </a:ln>
             <a:extLst>
               <a:ext uri="{91240B29-F687-4f45-9708-019B960494DF}">
-                <a14:hiddenLine xmlns="" xmlns:a14="http://schemas.microsoft.com/office/drawing/2010/main" w="9525">
+                <a14:hiddenLine xmlns:a14="http://schemas.microsoft.com/office/drawing/2010/main" xmlns="" w="9525">
                   <a:solidFill>
                     <a:srgbClr val="000000"/>
                   </a:solidFill>
@@ -4101,7 +4101,7 @@
             </a:ln>
             <a:extLst>
               <a:ext uri="{91240B29-F687-4f45-9708-019B960494DF}">
-                <a14:hiddenLine xmlns="" xmlns:a14="http://schemas.microsoft.com/office/drawing/2010/main" w="9525">
+                <a14:hiddenLine xmlns:a14="http://schemas.microsoft.com/office/drawing/2010/main" xmlns="" w="9525">
                   <a:solidFill>
                     <a:srgbClr val="000000"/>
                   </a:solidFill>
@@ -4169,7 +4169,7 @@
             </a:ln>
             <a:extLst>
               <a:ext uri="{91240B29-F687-4f45-9708-019B960494DF}">
-                <a14:hiddenLine xmlns="" xmlns:a14="http://schemas.microsoft.com/office/drawing/2010/main" w="9525">
+                <a14:hiddenLine xmlns:a14="http://schemas.microsoft.com/office/drawing/2010/main" xmlns="" w="9525">
                   <a:solidFill>
                     <a:srgbClr val="000000"/>
                   </a:solidFill>
@@ -4259,7 +4259,7 @@
             </a:ln>
             <a:extLst>
               <a:ext uri="{91240B29-F687-4f45-9708-019B960494DF}">
-                <a14:hiddenLine xmlns="" xmlns:a14="http://schemas.microsoft.com/office/drawing/2010/main" w="9525">
+                <a14:hiddenLine xmlns:a14="http://schemas.microsoft.com/office/drawing/2010/main" xmlns="" w="9525">
                   <a:solidFill>
                     <a:srgbClr val="000000"/>
                   </a:solidFill>
@@ -9073,7 +9073,7 @@
           <a:noFill/>
           <a:extLst>
             <a:ext uri="{909E8E84-426E-40dd-AFC4-6F175D3DCCD1}">
-              <a14:hiddenFill xmlns="" xmlns:a14="http://schemas.microsoft.com/office/drawing/2010/main">
+              <a14:hiddenFill xmlns:a14="http://schemas.microsoft.com/office/drawing/2010/main" xmlns="">
                 <a:solidFill>
                   <a:srgbClr val="FFFFFF"/>
                 </a:solidFill>
@@ -9147,7 +9147,7 @@
               </a:ln>
               <a:extLst>
                 <a:ext uri="{91240B29-F687-4f45-9708-019B960494DF}">
-                  <a14:hiddenLine xmlns="" xmlns:a14="http://schemas.microsoft.com/office/drawing/2010/main" w="9525">
+                  <a14:hiddenLine xmlns:a14="http://schemas.microsoft.com/office/drawing/2010/main" xmlns="" w="9525">
                     <a:solidFill>
                       <a:srgbClr val="000000"/>
                     </a:solidFill>
@@ -9237,7 +9237,7 @@
               </a:ln>
               <a:extLst>
                 <a:ext uri="{91240B29-F687-4f45-9708-019B960494DF}">
-                  <a14:hiddenLine xmlns="" xmlns:a14="http://schemas.microsoft.com/office/drawing/2010/main" w="9525">
+                  <a14:hiddenLine xmlns:a14="http://schemas.microsoft.com/office/drawing/2010/main" xmlns="" w="9525">
                     <a:solidFill>
                       <a:srgbClr val="000000"/>
                     </a:solidFill>
@@ -9327,7 +9327,7 @@
               </a:ln>
               <a:extLst>
                 <a:ext uri="{91240B29-F687-4f45-9708-019B960494DF}">
-                  <a14:hiddenLine xmlns="" xmlns:a14="http://schemas.microsoft.com/office/drawing/2010/main" w="9525">
+                  <a14:hiddenLine xmlns:a14="http://schemas.microsoft.com/office/drawing/2010/main" xmlns="" w="9525">
                     <a:solidFill>
                       <a:srgbClr val="000000"/>
                     </a:solidFill>
@@ -9389,7 +9389,7 @@
               </a:ln>
               <a:extLst>
                 <a:ext uri="{91240B29-F687-4f45-9708-019B960494DF}">
-                  <a14:hiddenLine xmlns="" xmlns:a14="http://schemas.microsoft.com/office/drawing/2010/main" w="9525">
+                  <a14:hiddenLine xmlns:a14="http://schemas.microsoft.com/office/drawing/2010/main" xmlns="" w="9525">
                     <a:solidFill>
                       <a:srgbClr val="000000"/>
                     </a:solidFill>
@@ -9479,7 +9479,7 @@
               </a:ln>
               <a:extLst>
                 <a:ext uri="{91240B29-F687-4f45-9708-019B960494DF}">
-                  <a14:hiddenLine xmlns="" xmlns:a14="http://schemas.microsoft.com/office/drawing/2010/main" w="9525">
+                  <a14:hiddenLine xmlns:a14="http://schemas.microsoft.com/office/drawing/2010/main" xmlns="" w="9525">
                     <a:solidFill>
                       <a:srgbClr val="000000"/>
                     </a:solidFill>
@@ -9541,7 +9541,7 @@
               </a:ln>
               <a:extLst>
                 <a:ext uri="{91240B29-F687-4f45-9708-019B960494DF}">
-                  <a14:hiddenLine xmlns="" xmlns:a14="http://schemas.microsoft.com/office/drawing/2010/main" w="9525">
+                  <a14:hiddenLine xmlns:a14="http://schemas.microsoft.com/office/drawing/2010/main" xmlns="" w="9525">
                     <a:solidFill>
                       <a:srgbClr val="000000"/>
                     </a:solidFill>
@@ -9603,7 +9603,7 @@
               </a:ln>
               <a:extLst>
                 <a:ext uri="{91240B29-F687-4f45-9708-019B960494DF}">
-                  <a14:hiddenLine xmlns="" xmlns:a14="http://schemas.microsoft.com/office/drawing/2010/main" w="9525">
+                  <a14:hiddenLine xmlns:a14="http://schemas.microsoft.com/office/drawing/2010/main" xmlns="" w="9525">
                     <a:solidFill>
                       <a:srgbClr val="000000"/>
                     </a:solidFill>
@@ -9693,7 +9693,7 @@
               </a:ln>
               <a:extLst>
                 <a:ext uri="{91240B29-F687-4f45-9708-019B960494DF}">
-                  <a14:hiddenLine xmlns="" xmlns:a14="http://schemas.microsoft.com/office/drawing/2010/main" w="9525">
+                  <a14:hiddenLine xmlns:a14="http://schemas.microsoft.com/office/drawing/2010/main" xmlns="" w="9525">
                     <a:solidFill>
                       <a:srgbClr val="000000"/>
                     </a:solidFill>
@@ -9783,7 +9783,7 @@
               </a:ln>
               <a:extLst>
                 <a:ext uri="{91240B29-F687-4f45-9708-019B960494DF}">
-                  <a14:hiddenLine xmlns="" xmlns:a14="http://schemas.microsoft.com/office/drawing/2010/main" w="9525">
+                  <a14:hiddenLine xmlns:a14="http://schemas.microsoft.com/office/drawing/2010/main" xmlns="" w="9525">
                     <a:solidFill>
                       <a:srgbClr val="000000"/>
                     </a:solidFill>
@@ -9845,7 +9845,7 @@
               </a:ln>
               <a:extLst>
                 <a:ext uri="{91240B29-F687-4f45-9708-019B960494DF}">
-                  <a14:hiddenLine xmlns="" xmlns:a14="http://schemas.microsoft.com/office/drawing/2010/main" w="9525">
+                  <a14:hiddenLine xmlns:a14="http://schemas.microsoft.com/office/drawing/2010/main" xmlns="" w="9525">
                     <a:solidFill>
                       <a:srgbClr val="000000"/>
                     </a:solidFill>
@@ -9955,7 +9955,7 @@
               </a:ln>
               <a:extLst>
                 <a:ext uri="{91240B29-F687-4f45-9708-019B960494DF}">
-                  <a14:hiddenLine xmlns="" xmlns:a14="http://schemas.microsoft.com/office/drawing/2010/main" w="9525">
+                  <a14:hiddenLine xmlns:a14="http://schemas.microsoft.com/office/drawing/2010/main" xmlns="" w="9525">
                     <a:solidFill>
                       <a:srgbClr val="000000"/>
                     </a:solidFill>
@@ -10039,7 +10039,7 @@
               </a:ln>
               <a:extLst>
                 <a:ext uri="{91240B29-F687-4f45-9708-019B960494DF}">
-                  <a14:hiddenLine xmlns="" xmlns:a14="http://schemas.microsoft.com/office/drawing/2010/main" w="9525">
+                  <a14:hiddenLine xmlns:a14="http://schemas.microsoft.com/office/drawing/2010/main" xmlns="" w="9525">
                     <a:solidFill>
                       <a:srgbClr val="000000"/>
                     </a:solidFill>
@@ -10101,7 +10101,7 @@
               </a:ln>
               <a:extLst>
                 <a:ext uri="{91240B29-F687-4f45-9708-019B960494DF}">
-                  <a14:hiddenLine xmlns="" xmlns:a14="http://schemas.microsoft.com/office/drawing/2010/main" w="9525">
+                  <a14:hiddenLine xmlns:a14="http://schemas.microsoft.com/office/drawing/2010/main" xmlns="" w="9525">
                     <a:solidFill>
                       <a:srgbClr val="000000"/>
                     </a:solidFill>
@@ -10163,7 +10163,7 @@
               </a:ln>
               <a:extLst>
                 <a:ext uri="{91240B29-F687-4f45-9708-019B960494DF}">
-                  <a14:hiddenLine xmlns="" xmlns:a14="http://schemas.microsoft.com/office/drawing/2010/main" w="9525">
+                  <a14:hiddenLine xmlns:a14="http://schemas.microsoft.com/office/drawing/2010/main" xmlns="" w="9525">
                     <a:solidFill>
                       <a:srgbClr val="000000"/>
                     </a:solidFill>
@@ -10253,7 +10253,7 @@
               </a:ln>
               <a:extLst>
                 <a:ext uri="{91240B29-F687-4f45-9708-019B960494DF}">
-                  <a14:hiddenLine xmlns="" xmlns:a14="http://schemas.microsoft.com/office/drawing/2010/main" w="9525">
+                  <a14:hiddenLine xmlns:a14="http://schemas.microsoft.com/office/drawing/2010/main" xmlns="" w="9525">
                     <a:solidFill>
                       <a:srgbClr val="000000"/>
                     </a:solidFill>
@@ -10287,7 +10287,7 @@
               </a:ln>
               <a:extLst>
                 <a:ext uri="{91240B29-F687-4f45-9708-019B960494DF}">
-                  <a14:hiddenLine xmlns="" xmlns:a14="http://schemas.microsoft.com/office/drawing/2010/main" w="9525">
+                  <a14:hiddenLine xmlns:a14="http://schemas.microsoft.com/office/drawing/2010/main" xmlns="" w="9525">
                     <a:solidFill>
                       <a:srgbClr val="000000"/>
                     </a:solidFill>
@@ -10352,7 +10352,7 @@
               </a:ln>
               <a:extLst>
                 <a:ext uri="{91240B29-F687-4f45-9708-019B960494DF}">
-                  <a14:hiddenLine xmlns="" xmlns:a14="http://schemas.microsoft.com/office/drawing/2010/main" w="9525">
+                  <a14:hiddenLine xmlns:a14="http://schemas.microsoft.com/office/drawing/2010/main" xmlns="" w="9525">
                     <a:solidFill>
                       <a:srgbClr val="000000"/>
                     </a:solidFill>
@@ -10442,7 +10442,7 @@
               </a:ln>
               <a:extLst>
                 <a:ext uri="{91240B29-F687-4f45-9708-019B960494DF}">
-                  <a14:hiddenLine xmlns="" xmlns:a14="http://schemas.microsoft.com/office/drawing/2010/main" w="9525">
+                  <a14:hiddenLine xmlns:a14="http://schemas.microsoft.com/office/drawing/2010/main" xmlns="" w="9525">
                     <a:solidFill>
                       <a:srgbClr val="000000"/>
                     </a:solidFill>
@@ -10504,7 +10504,7 @@
               </a:ln>
               <a:extLst>
                 <a:ext uri="{91240B29-F687-4f45-9708-019B960494DF}">
-                  <a14:hiddenLine xmlns="" xmlns:a14="http://schemas.microsoft.com/office/drawing/2010/main" w="9525">
+                  <a14:hiddenLine xmlns:a14="http://schemas.microsoft.com/office/drawing/2010/main" xmlns="" w="9525">
                     <a:solidFill>
                       <a:srgbClr val="000000"/>
                     </a:solidFill>
@@ -10594,7 +10594,7 @@
               </a:ln>
               <a:extLst>
                 <a:ext uri="{91240B29-F687-4f45-9708-019B960494DF}">
-                  <a14:hiddenLine xmlns="" xmlns:a14="http://schemas.microsoft.com/office/drawing/2010/main" w="9525">
+                  <a14:hiddenLine xmlns:a14="http://schemas.microsoft.com/office/drawing/2010/main" xmlns="" w="9525">
                     <a:solidFill>
                       <a:srgbClr val="000000"/>
                     </a:solidFill>
@@ -10659,7 +10659,7 @@
               </a:ln>
               <a:extLst>
                 <a:ext uri="{91240B29-F687-4f45-9708-019B960494DF}">
-                  <a14:hiddenLine xmlns="" xmlns:a14="http://schemas.microsoft.com/office/drawing/2010/main" w="9525">
+                  <a14:hiddenLine xmlns:a14="http://schemas.microsoft.com/office/drawing/2010/main" xmlns="" w="9525">
                     <a:solidFill>
                       <a:srgbClr val="000000"/>
                     </a:solidFill>
@@ -10721,7 +10721,7 @@
               </a:ln>
               <a:extLst>
                 <a:ext uri="{91240B29-F687-4f45-9708-019B960494DF}">
-                  <a14:hiddenLine xmlns="" xmlns:a14="http://schemas.microsoft.com/office/drawing/2010/main" w="9525">
+                  <a14:hiddenLine xmlns:a14="http://schemas.microsoft.com/office/drawing/2010/main" xmlns="" w="9525">
                     <a:solidFill>
                       <a:srgbClr val="000000"/>
                     </a:solidFill>
@@ -10811,7 +10811,7 @@
               </a:ln>
               <a:extLst>
                 <a:ext uri="{91240B29-F687-4f45-9708-019B960494DF}">
-                  <a14:hiddenLine xmlns="" xmlns:a14="http://schemas.microsoft.com/office/drawing/2010/main" w="9525">
+                  <a14:hiddenLine xmlns:a14="http://schemas.microsoft.com/office/drawing/2010/main" xmlns="" w="9525">
                     <a:solidFill>
                       <a:srgbClr val="000000"/>
                     </a:solidFill>
@@ -10901,7 +10901,7 @@
               </a:ln>
               <a:extLst>
                 <a:ext uri="{91240B29-F687-4f45-9708-019B960494DF}">
-                  <a14:hiddenLine xmlns="" xmlns:a14="http://schemas.microsoft.com/office/drawing/2010/main" w="9525">
+                  <a14:hiddenLine xmlns:a14="http://schemas.microsoft.com/office/drawing/2010/main" xmlns="" w="9525">
                     <a:solidFill>
                       <a:srgbClr val="000000"/>
                     </a:solidFill>
@@ -10966,7 +10966,7 @@
               </a:ln>
               <a:extLst>
                 <a:ext uri="{91240B29-F687-4f45-9708-019B960494DF}">
-                  <a14:hiddenLine xmlns="" xmlns:a14="http://schemas.microsoft.com/office/drawing/2010/main" w="9525">
+                  <a14:hiddenLine xmlns:a14="http://schemas.microsoft.com/office/drawing/2010/main" xmlns="" w="9525">
                     <a:solidFill>
                       <a:srgbClr val="000000"/>
                     </a:solidFill>
@@ -11086,7 +11086,7 @@
               </a:ln>
               <a:extLst>
                 <a:ext uri="{91240B29-F687-4f45-9708-019B960494DF}">
-                  <a14:hiddenLine xmlns="" xmlns:a14="http://schemas.microsoft.com/office/drawing/2010/main" w="9525">
+                  <a14:hiddenLine xmlns:a14="http://schemas.microsoft.com/office/drawing/2010/main" xmlns="" w="9525">
                     <a:solidFill>
                       <a:srgbClr val="000000"/>
                     </a:solidFill>
@@ -11167,7 +11167,7 @@
               </a:ln>
               <a:extLst>
                 <a:ext uri="{91240B29-F687-4f45-9708-019B960494DF}">
-                  <a14:hiddenLine xmlns="" xmlns:a14="http://schemas.microsoft.com/office/drawing/2010/main" w="9525">
+                  <a14:hiddenLine xmlns:a14="http://schemas.microsoft.com/office/drawing/2010/main" xmlns="" w="9525">
                     <a:solidFill>
                       <a:srgbClr val="000000"/>
                     </a:solidFill>
@@ -11282,7 +11282,7 @@
               </a:ln>
               <a:extLst>
                 <a:ext uri="{91240B29-F687-4f45-9708-019B960494DF}">
-                  <a14:hiddenLine xmlns="" xmlns:a14="http://schemas.microsoft.com/office/drawing/2010/main" w="9525">
+                  <a14:hiddenLine xmlns:a14="http://schemas.microsoft.com/office/drawing/2010/main" xmlns="" w="9525">
                     <a:solidFill>
                       <a:srgbClr val="000000"/>
                     </a:solidFill>
@@ -11372,7 +11372,7 @@
               </a:ln>
               <a:extLst>
                 <a:ext uri="{91240B29-F687-4f45-9708-019B960494DF}">
-                  <a14:hiddenLine xmlns="" xmlns:a14="http://schemas.microsoft.com/office/drawing/2010/main" w="9525">
+                  <a14:hiddenLine xmlns:a14="http://schemas.microsoft.com/office/drawing/2010/main" xmlns="" w="9525">
                     <a:solidFill>
                       <a:srgbClr val="000000"/>
                     </a:solidFill>
@@ -11437,7 +11437,7 @@
               </a:ln>
               <a:extLst>
                 <a:ext uri="{91240B29-F687-4f45-9708-019B960494DF}">
-                  <a14:hiddenLine xmlns="" xmlns:a14="http://schemas.microsoft.com/office/drawing/2010/main" w="9525">
+                  <a14:hiddenLine xmlns:a14="http://schemas.microsoft.com/office/drawing/2010/main" xmlns="" w="9525">
                     <a:solidFill>
                       <a:srgbClr val="000000"/>
                     </a:solidFill>
@@ -11527,7 +11527,7 @@
               </a:ln>
               <a:extLst>
                 <a:ext uri="{91240B29-F687-4f45-9708-019B960494DF}">
-                  <a14:hiddenLine xmlns="" xmlns:a14="http://schemas.microsoft.com/office/drawing/2010/main" w="9525">
+                  <a14:hiddenLine xmlns:a14="http://schemas.microsoft.com/office/drawing/2010/main" xmlns="" w="9525">
                     <a:solidFill>
                       <a:srgbClr val="000000"/>
                     </a:solidFill>
@@ -11595,7 +11595,7 @@
               </a:ln>
               <a:extLst>
                 <a:ext uri="{91240B29-F687-4f45-9708-019B960494DF}">
-                  <a14:hiddenLine xmlns="" xmlns:a14="http://schemas.microsoft.com/office/drawing/2010/main" w="9525">
+                  <a14:hiddenLine xmlns:a14="http://schemas.microsoft.com/office/drawing/2010/main" xmlns="" w="9525">
                     <a:solidFill>
                       <a:srgbClr val="000000"/>
                     </a:solidFill>
@@ -11685,7 +11685,7 @@
               </a:ln>
               <a:extLst>
                 <a:ext uri="{91240B29-F687-4f45-9708-019B960494DF}">
-                  <a14:hiddenLine xmlns="" xmlns:a14="http://schemas.microsoft.com/office/drawing/2010/main" w="9525">
+                  <a14:hiddenLine xmlns:a14="http://schemas.microsoft.com/office/drawing/2010/main" xmlns="" w="9525">
                     <a:solidFill>
                       <a:srgbClr val="000000"/>
                     </a:solidFill>
@@ -11753,7 +11753,7 @@
               </a:ln>
               <a:extLst>
                 <a:ext uri="{91240B29-F687-4f45-9708-019B960494DF}">
-                  <a14:hiddenLine xmlns="" xmlns:a14="http://schemas.microsoft.com/office/drawing/2010/main" w="9525">
+                  <a14:hiddenLine xmlns:a14="http://schemas.microsoft.com/office/drawing/2010/main" xmlns="" w="9525">
                     <a:solidFill>
                       <a:srgbClr val="000000"/>
                     </a:solidFill>
@@ -11843,7 +11843,7 @@
               </a:ln>
               <a:extLst>
                 <a:ext uri="{91240B29-F687-4f45-9708-019B960494DF}">
-                  <a14:hiddenLine xmlns="" xmlns:a14="http://schemas.microsoft.com/office/drawing/2010/main" w="9525">
+                  <a14:hiddenLine xmlns:a14="http://schemas.microsoft.com/office/drawing/2010/main" xmlns="" w="9525">
                     <a:solidFill>
                       <a:srgbClr val="000000"/>
                     </a:solidFill>
@@ -11877,7 +11877,7 @@
               </a:ln>
               <a:extLst>
                 <a:ext uri="{91240B29-F687-4f45-9708-019B960494DF}">
-                  <a14:hiddenLine xmlns="" xmlns:a14="http://schemas.microsoft.com/office/drawing/2010/main" w="9525">
+                  <a14:hiddenLine xmlns:a14="http://schemas.microsoft.com/office/drawing/2010/main" xmlns="" w="9525">
                     <a:solidFill>
                       <a:srgbClr val="000000"/>
                     </a:solidFill>
@@ -12696,11 +12696,7 @@
             </a:r>
             <a:r>
               <a:rPr lang="en-US" dirty="0" smtClean="0"/>
-              <a:t> your web </a:t>
-            </a:r>
-            <a:r>
-              <a:rPr lang="en-US" dirty="0" smtClean="0"/>
-              <a:t>site</a:t>
+              <a:t> your web site</a:t>
             </a:r>
           </a:p>
           <a:p>
@@ -12834,6 +12830,44 @@
               <a:t>Most cost $5-10 per month</a:t>
             </a:r>
             <a:endParaRPr lang="en-US" dirty="0"/>
+          </a:p>
+        </p:txBody>
+      </p:sp>
+      <p:sp>
+        <p:nvSpPr>
+          <p:cNvPr id="5" name="TextBox 4"/>
+          <p:cNvSpPr txBox="1"/>
+          <p:nvPr/>
+        </p:nvSpPr>
+        <p:spPr>
+          <a:xfrm>
+            <a:off x="1141410" y="4546600"/>
+            <a:ext cx="9475790" cy="584775"/>
+          </a:xfrm>
+          <a:prstGeom prst="rect">
+            <a:avLst/>
+          </a:prstGeom>
+          <a:noFill/>
+        </p:spPr>
+        <p:txBody>
+          <a:bodyPr wrap="square" rtlCol="0">
+            <a:spAutoFit/>
+          </a:bodyPr>
+          <a:lstStyle/>
+          <a:p>
+            <a:r>
+              <a:rPr lang="en-US" sz="3200" dirty="0">
+                <a:hlinkClick r:id="rId2"/>
+              </a:rPr>
+              <a:t>http://web-design-using-bootstrap.azurewebsites.net</a:t>
+            </a:r>
+            <a:r>
+              <a:rPr lang="en-US" sz="3200" dirty="0" smtClean="0">
+                <a:hlinkClick r:id="rId2"/>
+              </a:rPr>
+              <a:t>/</a:t>
+            </a:r>
+            <a:endParaRPr lang="en-US" sz="3200" dirty="0"/>
           </a:p>
         </p:txBody>
       </p:sp>

</xml_diff>